<commit_message>
Added the View Providers samples for Custom Filters.
</commit_message>
<xml_diff>
--- a/slides/AdvancedMvc.pptx
+++ b/slides/AdvancedMvc.pptx
@@ -245,7 +245,7 @@
               <a:pPr>
                 <a:defRPr/>
               </a:pPr>
-              <a:t>4/27/2011 10:31 PM</a:t>
+              <a:t>4/28/2011 10:27 PM</a:t>
             </a:fld>
             <a:endParaRPr lang="en-US"/>
           </a:p>
@@ -460,7 +460,7 @@
               <a:pPr>
                 <a:defRPr/>
               </a:pPr>
-              <a:t>4/27/2011 10:31 PM</a:t>
+              <a:t>4/28/2011 10:27 PM</a:t>
             </a:fld>
             <a:endParaRPr lang="en-US"/>
           </a:p>
@@ -865,7 +865,7 @@
             <a:fld id="{645EDAD1-88E4-4536-AD95-0BFD82EC77E6}" type="datetime8">
               <a:rPr lang="en-US" smtClean="0"/>
               <a:pPr/>
-              <a:t>4/27/2011 10:31 PM</a:t>
+              <a:t>4/28/2011 10:27 PM</a:t>
             </a:fld>
             <a:endParaRPr lang="en-US" smtClean="0"/>
           </a:p>
@@ -7172,13 +7172,8 @@
           <a:p>
             <a:r>
               <a:rPr lang="en-US" dirty="0" smtClean="0"/>
-              <a:t>Why</a:t>
-            </a:r>
-            <a:r>
-              <a:rPr lang="en-US" dirty="0" smtClean="0"/>
-              <a:t>?</a:t>
-            </a:r>
-            <a:endParaRPr lang="en-US" dirty="0" smtClean="0"/>
+              <a:t>Why?</a:t>
+            </a:r>
           </a:p>
           <a:p>
             <a:r>
@@ -7194,9 +7189,10 @@
           </a:p>
           <a:p>
             <a:r>
-              <a:rPr lang="en-US" dirty="0" smtClean="0"/>
-              <a:t>Embedded Views</a:t>
-            </a:r>
+              <a:rPr lang="en-US" smtClean="0"/>
+              <a:t>Custom Results</a:t>
+            </a:r>
+            <a:endParaRPr lang="en-US" dirty="0" smtClean="0"/>
           </a:p>
           <a:p>
             <a:r>
@@ -7209,7 +7205,6 @@
               <a:rPr lang="en-US" dirty="0" smtClean="0"/>
               <a:t>??</a:t>
             </a:r>
-            <a:endParaRPr lang="en-US" dirty="0" smtClean="0"/>
           </a:p>
         </p:txBody>
       </p:sp>
@@ -7348,13 +7343,8 @@
           <a:p>
             <a:r>
               <a:rPr lang="en-US" dirty="0" smtClean="0"/>
-              <a:t>http://</a:t>
-            </a:r>
-            <a:r>
-              <a:rPr lang="en-US" dirty="0" smtClean="0"/>
-              <a:t>github.com/lozanotek/advancedmvc</a:t>
-            </a:r>
-            <a:endParaRPr lang="en-US" dirty="0" smtClean="0"/>
+              <a:t>http://github.com/lozanotek/advancedmvc</a:t>
+            </a:r>
           </a:p>
         </p:txBody>
       </p:sp>

</xml_diff>

<commit_message>
Worked on the slides to get them nice and clean.
</commit_message>
<xml_diff>
--- a/slides/AdvancedMvc.pptx
+++ b/slides/AdvancedMvc.pptx
@@ -6,21 +6,24 @@
     <p:sldMasterId id="2147483656" r:id="rId2"/>
   </p:sldMasterIdLst>
   <p:notesMasterIdLst>
-    <p:notesMasterId r:id="rId7"/>
+    <p:notesMasterId r:id="rId10"/>
   </p:notesMasterIdLst>
   <p:handoutMasterIdLst>
-    <p:handoutMasterId r:id="rId8"/>
+    <p:handoutMasterId r:id="rId11"/>
   </p:handoutMasterIdLst>
   <p:sldIdLst>
     <p:sldId id="676" r:id="rId3"/>
-    <p:sldId id="677" r:id="rId4"/>
-    <p:sldId id="698" r:id="rId5"/>
-    <p:sldId id="696" r:id="rId6"/>
+    <p:sldId id="699" r:id="rId4"/>
+    <p:sldId id="700" r:id="rId5"/>
+    <p:sldId id="677" r:id="rId6"/>
+    <p:sldId id="701" r:id="rId7"/>
+    <p:sldId id="702" r:id="rId8"/>
+    <p:sldId id="696" r:id="rId9"/>
   </p:sldIdLst>
   <p:sldSz cx="9144000" cy="6858000" type="screen4x3"/>
   <p:notesSz cx="9601200" cy="7315200"/>
   <p:custDataLst>
-    <p:tags r:id="rId9"/>
+    <p:tags r:id="rId13"/>
   </p:custDataLst>
   <p:defaultTextStyle>
     <a:defPPr>
@@ -245,7 +248,7 @@
               <a:pPr>
                 <a:defRPr/>
               </a:pPr>
-              <a:t>4/28/2011 10:27 PM</a:t>
+              <a:t>7/26/12 21:38</a:t>
             </a:fld>
             <a:endParaRPr lang="en-US"/>
           </a:p>
@@ -460,7 +463,7 @@
               <a:pPr>
                 <a:defRPr/>
               </a:pPr>
-              <a:t>4/28/2011 10:27 PM</a:t>
+              <a:t>7/26/12 21:38</a:t>
             </a:fld>
             <a:endParaRPr lang="en-US"/>
           </a:p>
@@ -865,7 +868,7 @@
             <a:fld id="{645EDAD1-88E4-4536-AD95-0BFD82EC77E6}" type="datetime8">
               <a:rPr lang="en-US" smtClean="0"/>
               <a:pPr/>
-              <a:t>4/28/2011 10:27 PM</a:t>
+              <a:t>7/28/12 20:04</a:t>
             </a:fld>
             <a:endParaRPr lang="en-US" smtClean="0"/>
           </a:p>
@@ -1035,7 +1038,7 @@
   <p:clrMapOvr>
     <a:masterClrMapping/>
   </p:clrMapOvr>
-  <p:transition>
+  <p:transition xmlns:p14="http://schemas.microsoft.com/office/powerpoint/2010/main">
     <p:fade/>
   </p:transition>
 </p:sldLayout>
@@ -1143,47 +1146,12 @@
           </a:p>
         </p:txBody>
       </p:sp>
-      <p:sp>
-        <p:nvSpPr>
-          <p:cNvPr id="4" name="Rectangle 4"/>
-          <p:cNvSpPr>
-            <a:spLocks noGrp="1" noChangeArrowheads="1"/>
-          </p:cNvSpPr>
-          <p:nvPr>
-            <p:ph type="sldNum" sz="quarter" idx="10"/>
-          </p:nvPr>
-        </p:nvSpPr>
-        <p:spPr>
-          <a:ln/>
-        </p:spPr>
-        <p:txBody>
-          <a:bodyPr/>
-          <a:lstStyle>
-            <a:lvl1pPr>
-              <a:defRPr/>
-            </a:lvl1pPr>
-          </a:lstStyle>
-          <a:p>
-            <a:pPr>
-              <a:defRPr/>
-            </a:pPr>
-            <a:fld id="{92B88176-831A-484E-B623-F6F36D9CEE8A}" type="slidenum">
-              <a:rPr lang="en-US"/>
-              <a:pPr>
-                <a:defRPr/>
-              </a:pPr>
-              <a:t>‹#›</a:t>
-            </a:fld>
-            <a:endParaRPr lang="en-US"/>
-          </a:p>
-        </p:txBody>
-      </p:sp>
     </p:spTree>
   </p:cSld>
   <p:clrMapOvr>
     <a:masterClrMapping/>
   </p:clrMapOvr>
-  <p:transition>
+  <p:transition xmlns:p14="http://schemas.microsoft.com/office/powerpoint/2010/main">
     <p:fade/>
   </p:transition>
 </p:sldLayout>
@@ -1291,47 +1259,12 @@
           </a:p>
         </p:txBody>
       </p:sp>
-      <p:sp>
-        <p:nvSpPr>
-          <p:cNvPr id="4" name="Rectangle 4"/>
-          <p:cNvSpPr>
-            <a:spLocks noGrp="1" noChangeArrowheads="1"/>
-          </p:cNvSpPr>
-          <p:nvPr>
-            <p:ph type="sldNum" sz="quarter" idx="10"/>
-          </p:nvPr>
-        </p:nvSpPr>
-        <p:spPr>
-          <a:ln/>
-        </p:spPr>
-        <p:txBody>
-          <a:bodyPr/>
-          <a:lstStyle>
-            <a:lvl1pPr>
-              <a:defRPr/>
-            </a:lvl1pPr>
-          </a:lstStyle>
-          <a:p>
-            <a:pPr>
-              <a:defRPr/>
-            </a:pPr>
-            <a:fld id="{29DA06B7-38C5-4C08-BE73-7F767404FA56}" type="slidenum">
-              <a:rPr lang="en-US"/>
-              <a:pPr>
-                <a:defRPr/>
-              </a:pPr>
-              <a:t>‹#›</a:t>
-            </a:fld>
-            <a:endParaRPr lang="en-US"/>
-          </a:p>
-        </p:txBody>
-      </p:sp>
     </p:spTree>
   </p:cSld>
   <p:clrMapOvr>
     <a:masterClrMapping/>
   </p:clrMapOvr>
-  <p:transition>
+  <p:transition xmlns:p14="http://schemas.microsoft.com/office/powerpoint/2010/main">
     <p:fade/>
   </p:transition>
 </p:sldLayout>
@@ -3352,47 +3285,12 @@
           </a:p>
         </p:txBody>
       </p:sp>
-      <p:sp>
-        <p:nvSpPr>
-          <p:cNvPr id="4" name="Rectangle 4"/>
-          <p:cNvSpPr>
-            <a:spLocks noGrp="1" noChangeArrowheads="1"/>
-          </p:cNvSpPr>
-          <p:nvPr>
-            <p:ph type="sldNum" sz="quarter" idx="10"/>
-          </p:nvPr>
-        </p:nvSpPr>
-        <p:spPr>
-          <a:ln/>
-        </p:spPr>
-        <p:txBody>
-          <a:bodyPr/>
-          <a:lstStyle>
-            <a:lvl1pPr>
-              <a:defRPr/>
-            </a:lvl1pPr>
-          </a:lstStyle>
-          <a:p>
-            <a:pPr>
-              <a:defRPr/>
-            </a:pPr>
-            <a:fld id="{B63753EC-566D-40B0-951D-58F31B9256E5}" type="slidenum">
-              <a:rPr lang="en-US"/>
-              <a:pPr>
-                <a:defRPr/>
-              </a:pPr>
-              <a:t>‹#›</a:t>
-            </a:fld>
-            <a:endParaRPr lang="en-US"/>
-          </a:p>
-        </p:txBody>
-      </p:sp>
     </p:spTree>
   </p:cSld>
   <p:clrMapOvr>
     <a:masterClrMapping/>
   </p:clrMapOvr>
-  <p:transition>
+  <p:transition xmlns:p14="http://schemas.microsoft.com/office/powerpoint/2010/main">
     <p:fade/>
   </p:transition>
 </p:sldLayout>
@@ -4179,47 +4077,12 @@
           </a:p>
         </p:txBody>
       </p:sp>
-      <p:sp>
-        <p:nvSpPr>
-          <p:cNvPr id="4" name="Rectangle 4"/>
-          <p:cNvSpPr>
-            <a:spLocks noGrp="1" noChangeArrowheads="1"/>
-          </p:cNvSpPr>
-          <p:nvPr>
-            <p:ph type="sldNum" sz="quarter" idx="10"/>
-          </p:nvPr>
-        </p:nvSpPr>
-        <p:spPr>
-          <a:ln/>
-        </p:spPr>
-        <p:txBody>
-          <a:bodyPr/>
-          <a:lstStyle>
-            <a:lvl1pPr>
-              <a:defRPr/>
-            </a:lvl1pPr>
-          </a:lstStyle>
-          <a:p>
-            <a:pPr>
-              <a:defRPr/>
-            </a:pPr>
-            <a:fld id="{E53149F8-8ADD-4D75-A885-78E7C59851A4}" type="slidenum">
-              <a:rPr lang="en-US"/>
-              <a:pPr>
-                <a:defRPr/>
-              </a:pPr>
-              <a:t>‹#›</a:t>
-            </a:fld>
-            <a:endParaRPr lang="en-US"/>
-          </a:p>
-        </p:txBody>
-      </p:sp>
     </p:spTree>
   </p:cSld>
   <p:clrMapOvr>
     <a:masterClrMapping/>
   </p:clrMapOvr>
-  <p:transition>
+  <p:transition xmlns:p14="http://schemas.microsoft.com/office/powerpoint/2010/main">
     <p:fade/>
   </p:transition>
 </p:sldLayout>
@@ -4440,47 +4303,12 @@
           </a:p>
         </p:txBody>
       </p:sp>
-      <p:sp>
-        <p:nvSpPr>
-          <p:cNvPr id="5" name="Rectangle 4"/>
-          <p:cNvSpPr>
-            <a:spLocks noGrp="1" noChangeArrowheads="1"/>
-          </p:cNvSpPr>
-          <p:nvPr>
-            <p:ph type="sldNum" sz="quarter" idx="10"/>
-          </p:nvPr>
-        </p:nvSpPr>
-        <p:spPr>
-          <a:ln/>
-        </p:spPr>
-        <p:txBody>
-          <a:bodyPr/>
-          <a:lstStyle>
-            <a:lvl1pPr>
-              <a:defRPr/>
-            </a:lvl1pPr>
-          </a:lstStyle>
-          <a:p>
-            <a:pPr>
-              <a:defRPr/>
-            </a:pPr>
-            <a:fld id="{D663ADD5-AD60-4918-A2E4-B76AAFBBD44A}" type="slidenum">
-              <a:rPr lang="en-US"/>
-              <a:pPr>
-                <a:defRPr/>
-              </a:pPr>
-              <a:t>‹#›</a:t>
-            </a:fld>
-            <a:endParaRPr lang="en-US"/>
-          </a:p>
-        </p:txBody>
-      </p:sp>
     </p:spTree>
   </p:cSld>
   <p:clrMapOvr>
     <a:masterClrMapping/>
   </p:clrMapOvr>
-  <p:transition>
+  <p:transition xmlns:p14="http://schemas.microsoft.com/office/powerpoint/2010/main">
     <p:fade/>
   </p:transition>
 </p:sldLayout>
@@ -4835,47 +4663,12 @@
           </a:p>
         </p:txBody>
       </p:sp>
-      <p:sp>
-        <p:nvSpPr>
-          <p:cNvPr id="7" name="Rectangle 4"/>
-          <p:cNvSpPr>
-            <a:spLocks noGrp="1" noChangeArrowheads="1"/>
-          </p:cNvSpPr>
-          <p:nvPr>
-            <p:ph type="sldNum" sz="quarter" idx="10"/>
-          </p:nvPr>
-        </p:nvSpPr>
-        <p:spPr>
-          <a:ln/>
-        </p:spPr>
-        <p:txBody>
-          <a:bodyPr/>
-          <a:lstStyle>
-            <a:lvl1pPr>
-              <a:defRPr/>
-            </a:lvl1pPr>
-          </a:lstStyle>
-          <a:p>
-            <a:pPr>
-              <a:defRPr/>
-            </a:pPr>
-            <a:fld id="{FDA9B3E0-EA19-4126-ADA4-33DFDDF64D97}" type="slidenum">
-              <a:rPr lang="en-US"/>
-              <a:pPr>
-                <a:defRPr/>
-              </a:pPr>
-              <a:t>‹#›</a:t>
-            </a:fld>
-            <a:endParaRPr lang="en-US"/>
-          </a:p>
-        </p:txBody>
-      </p:sp>
     </p:spTree>
   </p:cSld>
   <p:clrMapOvr>
     <a:masterClrMapping/>
   </p:clrMapOvr>
-  <p:transition>
+  <p:transition xmlns:p14="http://schemas.microsoft.com/office/powerpoint/2010/main">
     <p:fade/>
   </p:transition>
 </p:sldLayout>
@@ -4926,47 +4719,12 @@
           </a:p>
         </p:txBody>
       </p:sp>
-      <p:sp>
-        <p:nvSpPr>
-          <p:cNvPr id="3" name="Rectangle 4"/>
-          <p:cNvSpPr>
-            <a:spLocks noGrp="1" noChangeArrowheads="1"/>
-          </p:cNvSpPr>
-          <p:nvPr>
-            <p:ph type="sldNum" sz="quarter" idx="10"/>
-          </p:nvPr>
-        </p:nvSpPr>
-        <p:spPr>
-          <a:ln/>
-        </p:spPr>
-        <p:txBody>
-          <a:bodyPr/>
-          <a:lstStyle>
-            <a:lvl1pPr>
-              <a:defRPr/>
-            </a:lvl1pPr>
-          </a:lstStyle>
-          <a:p>
-            <a:pPr>
-              <a:defRPr/>
-            </a:pPr>
-            <a:fld id="{283C1B83-F1ED-41DF-B506-0156CFE66CF4}" type="slidenum">
-              <a:rPr lang="en-US"/>
-              <a:pPr>
-                <a:defRPr/>
-              </a:pPr>
-              <a:t>‹#›</a:t>
-            </a:fld>
-            <a:endParaRPr lang="en-US"/>
-          </a:p>
-        </p:txBody>
-      </p:sp>
     </p:spTree>
   </p:cSld>
   <p:clrMapOvr>
     <a:masterClrMapping/>
   </p:clrMapOvr>
-  <p:transition>
+  <p:transition xmlns:p14="http://schemas.microsoft.com/office/powerpoint/2010/main">
     <p:fade/>
   </p:transition>
 </p:sldLayout>
@@ -4989,47 +4747,12 @@
           <a:chExt cx="0" cy="0"/>
         </a:xfrm>
       </p:grpSpPr>
-      <p:sp>
-        <p:nvSpPr>
-          <p:cNvPr id="2" name="Rectangle 4"/>
-          <p:cNvSpPr>
-            <a:spLocks noGrp="1" noChangeArrowheads="1"/>
-          </p:cNvSpPr>
-          <p:nvPr>
-            <p:ph type="sldNum" sz="quarter" idx="10"/>
-          </p:nvPr>
-        </p:nvSpPr>
-        <p:spPr>
-          <a:ln/>
-        </p:spPr>
-        <p:txBody>
-          <a:bodyPr/>
-          <a:lstStyle>
-            <a:lvl1pPr>
-              <a:defRPr/>
-            </a:lvl1pPr>
-          </a:lstStyle>
-          <a:p>
-            <a:pPr>
-              <a:defRPr/>
-            </a:pPr>
-            <a:fld id="{DF6497B8-0A58-42C7-BA62-0DAC32F4C556}" type="slidenum">
-              <a:rPr lang="en-US"/>
-              <a:pPr>
-                <a:defRPr/>
-              </a:pPr>
-              <a:t>‹#›</a:t>
-            </a:fld>
-            <a:endParaRPr lang="en-US"/>
-          </a:p>
-        </p:txBody>
-      </p:sp>
     </p:spTree>
   </p:cSld>
   <p:clrMapOvr>
     <a:masterClrMapping/>
   </p:clrMapOvr>
-  <p:transition>
+  <p:transition xmlns:p14="http://schemas.microsoft.com/office/powerpoint/2010/main">
     <p:fade/>
   </p:transition>
 </p:sldLayout>
@@ -5234,47 +4957,12 @@
           </a:p>
         </p:txBody>
       </p:sp>
-      <p:sp>
-        <p:nvSpPr>
-          <p:cNvPr id="5" name="Rectangle 4"/>
-          <p:cNvSpPr>
-            <a:spLocks noGrp="1" noChangeArrowheads="1"/>
-          </p:cNvSpPr>
-          <p:nvPr>
-            <p:ph type="sldNum" sz="quarter" idx="10"/>
-          </p:nvPr>
-        </p:nvSpPr>
-        <p:spPr>
-          <a:ln/>
-        </p:spPr>
-        <p:txBody>
-          <a:bodyPr/>
-          <a:lstStyle>
-            <a:lvl1pPr>
-              <a:defRPr/>
-            </a:lvl1pPr>
-          </a:lstStyle>
-          <a:p>
-            <a:pPr>
-              <a:defRPr/>
-            </a:pPr>
-            <a:fld id="{46629F1E-1006-4417-B7C7-D0FBBF494C23}" type="slidenum">
-              <a:rPr lang="en-US"/>
-              <a:pPr>
-                <a:defRPr/>
-              </a:pPr>
-              <a:t>‹#›</a:t>
-            </a:fld>
-            <a:endParaRPr lang="en-US"/>
-          </a:p>
-        </p:txBody>
-      </p:sp>
     </p:spTree>
   </p:cSld>
   <p:clrMapOvr>
     <a:masterClrMapping/>
   </p:clrMapOvr>
-  <p:transition>
+  <p:transition xmlns:p14="http://schemas.microsoft.com/office/powerpoint/2010/main">
     <p:fade/>
   </p:transition>
 </p:sldLayout>
@@ -5459,47 +5147,12 @@
           </a:p>
         </p:txBody>
       </p:sp>
-      <p:sp>
-        <p:nvSpPr>
-          <p:cNvPr id="5" name="Rectangle 4"/>
-          <p:cNvSpPr>
-            <a:spLocks noGrp="1" noChangeArrowheads="1"/>
-          </p:cNvSpPr>
-          <p:nvPr>
-            <p:ph type="sldNum" sz="quarter" idx="10"/>
-          </p:nvPr>
-        </p:nvSpPr>
-        <p:spPr>
-          <a:ln/>
-        </p:spPr>
-        <p:txBody>
-          <a:bodyPr/>
-          <a:lstStyle>
-            <a:lvl1pPr>
-              <a:defRPr/>
-            </a:lvl1pPr>
-          </a:lstStyle>
-          <a:p>
-            <a:pPr>
-              <a:defRPr/>
-            </a:pPr>
-            <a:fld id="{78A75F9F-B676-438C-9F9B-07465088AF08}" type="slidenum">
-              <a:rPr lang="en-US"/>
-              <a:pPr>
-                <a:defRPr/>
-              </a:pPr>
-              <a:t>‹#›</a:t>
-            </a:fld>
-            <a:endParaRPr lang="en-US"/>
-          </a:p>
-        </p:txBody>
-      </p:sp>
     </p:spTree>
   </p:cSld>
   <p:clrMapOvr>
     <a:masterClrMapping/>
   </p:clrMapOvr>
-  <p:transition>
+  <p:transition xmlns:p14="http://schemas.microsoft.com/office/powerpoint/2010/main">
     <p:fade/>
   </p:transition>
 </p:sldLayout>
@@ -5650,67 +5303,6 @@
           </a:p>
         </p:txBody>
       </p:sp>
-      <p:sp>
-        <p:nvSpPr>
-          <p:cNvPr id="1361924" name="Rectangle 4"/>
-          <p:cNvSpPr>
-            <a:spLocks noGrp="1" noChangeArrowheads="1"/>
-          </p:cNvSpPr>
-          <p:nvPr>
-            <p:ph type="sldNum" sz="quarter" idx="4"/>
-          </p:nvPr>
-        </p:nvSpPr>
-        <p:spPr bwMode="auto">
-          <a:xfrm>
-            <a:off x="6845300" y="6445250"/>
-            <a:ext cx="2133600" cy="476250"/>
-          </a:xfrm>
-          <a:prstGeom prst="rect">
-            <a:avLst/>
-          </a:prstGeom>
-          <a:noFill/>
-          <a:ln w="9525">
-            <a:noFill/>
-            <a:miter lim="800000"/>
-            <a:headEnd/>
-            <a:tailEnd/>
-          </a:ln>
-          <a:effectLst/>
-        </p:spPr>
-        <p:txBody>
-          <a:bodyPr vert="horz" wrap="square" lIns="91440" tIns="45720" rIns="91440" bIns="45720" numCol="1" anchor="t" anchorCtr="0" compatLnSpc="1">
-            <a:prstTxWarp prst="textNoShape">
-              <a:avLst/>
-            </a:prstTxWarp>
-          </a:bodyPr>
-          <a:lstStyle>
-            <a:lvl1pPr algn="r" eaLnBrk="1" hangingPunct="1">
-              <a:lnSpc>
-                <a:spcPct val="100000"/>
-              </a:lnSpc>
-              <a:spcBef>
-                <a:spcPct val="0"/>
-              </a:spcBef>
-              <a:defRPr sz="1400" b="1">
-                <a:latin typeface="Times New Roman" pitchFamily="18" charset="0"/>
-              </a:defRPr>
-            </a:lvl1pPr>
-          </a:lstStyle>
-          <a:p>
-            <a:pPr>
-              <a:defRPr/>
-            </a:pPr>
-            <a:fld id="{3CC0A027-A719-40CD-9809-0A4D87F31B4F}" type="slidenum">
-              <a:rPr lang="en-US"/>
-              <a:pPr>
-                <a:defRPr/>
-              </a:pPr>
-              <a:t>‹#›</a:t>
-            </a:fld>
-            <a:endParaRPr lang="en-US"/>
-          </a:p>
-        </p:txBody>
-      </p:sp>
     </p:spTree>
   </p:cSld>
   <p:clrMap bg1="dk2" tx1="lt1" bg2="dk1" tx2="lt2" accent1="accent1" accent2="accent2" accent3="accent3" accent4="accent4" accent5="accent5" accent6="accent6" hlink="hlink" folHlink="folHlink"/>
@@ -5727,13 +5319,13 @@
     <p:sldLayoutId id="2147483779" r:id="rId10"/>
     <p:sldLayoutId id="2147483780" r:id="rId11"/>
   </p:sldLayoutIdLst>
-  <p:transition>
+  <p:transition xmlns:p14="http://schemas.microsoft.com/office/powerpoint/2010/main">
     <p:fade/>
   </p:transition>
   <p:timing>
     <p:tnLst>
       <p:par>
-        <p:cTn id="1" dur="indefinite" restart="never" nodeType="tmRoot"/>
+        <p:cTn xmlns:p14="http://schemas.microsoft.com/office/powerpoint/2010/main" id="1" dur="indefinite" restart="never" nodeType="tmRoot"/>
       </p:par>
     </p:tnLst>
   </p:timing>
@@ -7059,7 +6651,7 @@
       </p:sp>
       <p:sp>
         <p:nvSpPr>
-          <p:cNvPr id="1369092" name="Rectangle 4"/>
+          <p:cNvPr id="4" name="Rectangle 4"/>
           <p:cNvSpPr>
             <a:spLocks noGrp="1" noChangeArrowheads="1"/>
           </p:cNvSpPr>
@@ -7069,8 +6661,8 @@
         </p:nvSpPr>
         <p:spPr>
           <a:xfrm>
-            <a:off x="304800" y="5257800"/>
-            <a:ext cx="8077200" cy="535531"/>
+            <a:off x="304800" y="4953000"/>
+            <a:ext cx="8077200" cy="1752600"/>
           </a:xfrm>
         </p:spPr>
         <p:txBody>
@@ -7089,6 +6681,58 @@
               </a:rPr>
               <a:t>Javier G. Lozano</a:t>
             </a:r>
+          </a:p>
+          <a:p>
+            <a:pPr eaLnBrk="1" hangingPunct="1">
+              <a:buNone/>
+              <a:defRPr/>
+            </a:pPr>
+            <a:r>
+              <a:rPr lang="en-US" b="1" dirty="0" smtClean="0">
+                <a:solidFill>
+                  <a:schemeClr val="tx2"/>
+                </a:solidFill>
+              </a:rPr>
+              <a:t>javier@lozanotek.com</a:t>
+            </a:r>
+          </a:p>
+          <a:p>
+            <a:pPr eaLnBrk="1" hangingPunct="1">
+              <a:buNone/>
+              <a:defRPr/>
+            </a:pPr>
+            <a:r>
+              <a:rPr lang="en-US" b="1" dirty="0" smtClean="0">
+                <a:solidFill>
+                  <a:schemeClr val="tx2"/>
+                </a:solidFill>
+              </a:rPr>
+              <a:t>@</a:t>
+            </a:r>
+            <a:r>
+              <a:rPr lang="en-US" b="1" dirty="0" err="1" smtClean="0">
+                <a:solidFill>
+                  <a:schemeClr val="tx2"/>
+                </a:solidFill>
+              </a:rPr>
+              <a:t>jglozano</a:t>
+            </a:r>
+            <a:endParaRPr lang="en-US" b="1" dirty="0" smtClean="0">
+              <a:solidFill>
+                <a:schemeClr val="tx2"/>
+              </a:solidFill>
+            </a:endParaRPr>
+          </a:p>
+          <a:p>
+            <a:pPr eaLnBrk="1" hangingPunct="1">
+              <a:buNone/>
+              <a:defRPr/>
+            </a:pPr>
+            <a:endParaRPr lang="en-US" b="1" dirty="0" smtClean="0">
+              <a:solidFill>
+                <a:schemeClr val="tx2"/>
+              </a:solidFill>
+            </a:endParaRPr>
           </a:p>
         </p:txBody>
       </p:sp>
@@ -7097,13 +6741,13 @@
   <p:clrMapOvr>
     <a:masterClrMapping/>
   </p:clrMapOvr>
-  <p:transition>
+  <p:transition xmlns:p14="http://schemas.microsoft.com/office/powerpoint/2010/main">
     <p:fade/>
   </p:transition>
   <p:timing>
     <p:tnLst>
       <p:par>
-        <p:cTn id="1" dur="indefinite" restart="never" nodeType="tmRoot"/>
+        <p:cTn xmlns:p14="http://schemas.microsoft.com/office/powerpoint/2010/main" id="1" dur="indefinite" restart="never" nodeType="tmRoot"/>
       </p:par>
     </p:tnLst>
   </p:timing>
@@ -7127,128 +6771,2206 @@
           <a:chExt cx="0" cy="0"/>
         </a:xfrm>
       </p:grpSpPr>
-      <p:sp>
-        <p:nvSpPr>
-          <p:cNvPr id="2" name="Title 1"/>
-          <p:cNvSpPr>
-            <a:spLocks noGrp="1"/>
-          </p:cNvSpPr>
-          <p:nvPr>
-            <p:ph type="title"/>
-          </p:nvPr>
-        </p:nvSpPr>
-        <p:spPr/>
-        <p:txBody>
-          <a:bodyPr/>
-          <a:lstStyle/>
-          <a:p>
-            <a:r>
-              <a:rPr lang="en-US" b="1" dirty="0" smtClean="0"/>
-              <a:t>Agenda</a:t>
-            </a:r>
-            <a:endParaRPr lang="en-US" b="1" dirty="0"/>
-          </a:p>
-        </p:txBody>
-      </p:sp>
-      <p:sp>
-        <p:nvSpPr>
-          <p:cNvPr id="3" name="Content Placeholder 2"/>
-          <p:cNvSpPr>
-            <a:spLocks noGrp="1"/>
-          </p:cNvSpPr>
-          <p:nvPr>
-            <p:ph idx="1"/>
-          </p:nvPr>
-        </p:nvSpPr>
-        <p:spPr>
+      <p:grpSp>
+        <p:nvGrpSpPr>
+          <p:cNvPr id="50" name="Group 49"/>
+          <p:cNvGrpSpPr/>
+          <p:nvPr/>
+        </p:nvGrpSpPr>
+        <p:grpSpPr>
           <a:xfrm>
-            <a:off x="381002" y="1417638"/>
-            <a:ext cx="8410575" cy="3490186"/>
+            <a:off x="123216" y="84026"/>
+            <a:ext cx="8915400" cy="6714790"/>
+            <a:chOff x="123216" y="84026"/>
+            <a:chExt cx="8915400" cy="6714790"/>
           </a:xfrm>
-        </p:spPr>
-        <p:txBody>
-          <a:bodyPr/>
-          <a:lstStyle/>
-          <a:p>
-            <a:r>
-              <a:rPr lang="en-US" dirty="0" smtClean="0"/>
-              <a:t>Why?</a:t>
-            </a:r>
-          </a:p>
-          <a:p>
-            <a:r>
-              <a:rPr lang="en-US" dirty="0" smtClean="0"/>
-              <a:t>Inferred Actions</a:t>
-            </a:r>
-          </a:p>
-          <a:p>
-            <a:r>
-              <a:rPr lang="en-US" dirty="0" smtClean="0"/>
-              <a:t>POCO Results</a:t>
-            </a:r>
-          </a:p>
-          <a:p>
-            <a:r>
-              <a:rPr lang="en-US" smtClean="0"/>
-              <a:t>Custom Results</a:t>
-            </a:r>
-            <a:endParaRPr lang="en-US" dirty="0" smtClean="0"/>
-          </a:p>
-          <a:p>
-            <a:r>
-              <a:rPr lang="en-US" dirty="0" smtClean="0"/>
-              <a:t>Dynamic Page Views</a:t>
-            </a:r>
-          </a:p>
-          <a:p>
-            <a:r>
-              <a:rPr lang="en-US" dirty="0" smtClean="0"/>
-              <a:t>??</a:t>
-            </a:r>
-          </a:p>
-        </p:txBody>
-      </p:sp>
-      <p:sp>
-        <p:nvSpPr>
-          <p:cNvPr id="4" name="Slide Number Placeholder 3"/>
-          <p:cNvSpPr>
-            <a:spLocks noGrp="1"/>
-          </p:cNvSpPr>
-          <p:nvPr>
-            <p:ph type="sldNum" sz="quarter" idx="10"/>
-          </p:nvPr>
-        </p:nvSpPr>
-        <p:spPr/>
-        <p:txBody>
-          <a:bodyPr/>
-          <a:lstStyle/>
-          <a:p>
-            <a:pPr>
-              <a:defRPr/>
-            </a:pPr>
-            <a:fld id="{B63753EC-566D-40B0-951D-58F31B9256E5}" type="slidenum">
-              <a:rPr lang="en-US" smtClean="0"/>
-              <a:pPr>
-                <a:defRPr/>
-              </a:pPr>
-              <a:t>2</a:t>
-            </a:fld>
-            <a:endParaRPr lang="en-US"/>
-          </a:p>
-        </p:txBody>
-      </p:sp>
+        </p:grpSpPr>
+        <p:grpSp>
+          <p:nvGrpSpPr>
+            <p:cNvPr id="43" name="Group 42"/>
+            <p:cNvGrpSpPr/>
+            <p:nvPr/>
+          </p:nvGrpSpPr>
+          <p:grpSpPr>
+            <a:xfrm>
+              <a:off x="152400" y="84026"/>
+              <a:ext cx="8855055" cy="1371600"/>
+              <a:chOff x="152400" y="93754"/>
+              <a:chExt cx="8855055" cy="1371600"/>
+            </a:xfrm>
+          </p:grpSpPr>
+          <p:sp>
+            <p:nvSpPr>
+              <p:cNvPr id="38" name="Rounded Rectangle 37"/>
+              <p:cNvSpPr/>
+              <p:nvPr/>
+            </p:nvSpPr>
+            <p:spPr>
+              <a:xfrm>
+                <a:off x="152400" y="93754"/>
+                <a:ext cx="8855055" cy="1371600"/>
+              </a:xfrm>
+              <a:prstGeom prst="roundRect">
+                <a:avLst/>
+              </a:prstGeom>
+              <a:solidFill>
+                <a:schemeClr val="tx1"/>
+              </a:solidFill>
+              <a:ln>
+                <a:solidFill>
+                  <a:srgbClr val="7030A0"/>
+                </a:solidFill>
+              </a:ln>
+              <a:effectLst>
+                <a:outerShdw blurRad="50800" dist="38100" dir="18900000" algn="bl" rotWithShape="0">
+                  <a:prstClr val="black">
+                    <a:alpha val="40000"/>
+                  </a:prstClr>
+                </a:outerShdw>
+              </a:effectLst>
+            </p:spPr>
+            <p:style>
+              <a:lnRef idx="2">
+                <a:schemeClr val="accent1">
+                  <a:shade val="50000"/>
+                </a:schemeClr>
+              </a:lnRef>
+              <a:fillRef idx="1">
+                <a:schemeClr val="accent1"/>
+              </a:fillRef>
+              <a:effectRef idx="0">
+                <a:schemeClr val="accent1"/>
+              </a:effectRef>
+              <a:fontRef idx="minor">
+                <a:schemeClr val="lt1"/>
+              </a:fontRef>
+            </p:style>
+            <p:txBody>
+              <a:bodyPr rtlCol="0" anchor="ctr"/>
+              <a:lstStyle/>
+              <a:p>
+                <a:pPr algn="ctr"/>
+                <a:endParaRPr lang="en-US"/>
+              </a:p>
+            </p:txBody>
+          </p:sp>
+          <p:pic>
+            <p:nvPicPr>
+              <p:cNvPr id="5" name="Picture 2"/>
+              <p:cNvPicPr>
+                <a:picLocks noChangeAspect="1" noChangeArrowheads="1"/>
+              </p:cNvPicPr>
+              <p:nvPr/>
+            </p:nvPicPr>
+            <p:blipFill>
+              <a:blip r:embed="rId2">
+                <a:extLst>
+                  <a:ext uri="{28A0092B-C50C-407E-A947-70E740481C1C}">
+                    <a14:useLocalDpi xmlns:a14="http://schemas.microsoft.com/office/drawing/2010/main" val="0"/>
+                  </a:ext>
+                </a:extLst>
+              </a:blip>
+              <a:srcRect/>
+              <a:stretch>
+                <a:fillRect/>
+              </a:stretch>
+            </p:blipFill>
+            <p:spPr bwMode="auto">
+              <a:xfrm>
+                <a:off x="366187" y="590516"/>
+                <a:ext cx="1662307" cy="781084"/>
+              </a:xfrm>
+              <a:prstGeom prst="rect">
+                <a:avLst/>
+              </a:prstGeom>
+              <a:noFill/>
+              <a:ln>
+                <a:noFill/>
+              </a:ln>
+              <a:effectLst/>
+              <a:extLst>
+                <a:ext uri="{909E8E84-426E-40dd-AFC4-6F175D3DCCD1}">
+                  <a14:hiddenFill xmlns:a14="http://schemas.microsoft.com/office/drawing/2010/main">
+                    <a:solidFill>
+                      <a:schemeClr val="accent1"/>
+                    </a:solidFill>
+                  </a14:hiddenFill>
+                </a:ext>
+                <a:ext uri="{91240B29-F687-4f45-9708-019B960494DF}">
+                  <a14:hiddenLine xmlns:a14="http://schemas.microsoft.com/office/drawing/2010/main" w="9525">
+                    <a:solidFill>
+                      <a:schemeClr val="tx1"/>
+                    </a:solidFill>
+                    <a:miter lim="800000"/>
+                    <a:headEnd/>
+                    <a:tailEnd/>
+                  </a14:hiddenLine>
+                </a:ext>
+                <a:ext uri="{AF507438-7753-43e0-B8FC-AC1667EBCBE1}">
+                  <a14:hiddenEffects xmlns:a14="http://schemas.microsoft.com/office/drawing/2010/main">
+                    <a:effectLst>
+                      <a:outerShdw dist="35921" dir="2700000" algn="ctr" rotWithShape="0">
+                        <a:schemeClr val="bg2"/>
+                      </a:outerShdw>
+                    </a:effectLst>
+                  </a14:hiddenEffects>
+                </a:ext>
+              </a:extLst>
+            </p:spPr>
+          </p:pic>
+          <p:pic>
+            <p:nvPicPr>
+              <p:cNvPr id="6" name="Picture 3"/>
+              <p:cNvPicPr>
+                <a:picLocks noChangeAspect="1" noChangeArrowheads="1"/>
+              </p:cNvPicPr>
+              <p:nvPr/>
+            </p:nvPicPr>
+            <p:blipFill>
+              <a:blip r:embed="rId3">
+                <a:extLst>
+                  <a:ext uri="{28A0092B-C50C-407E-A947-70E740481C1C}">
+                    <a14:useLocalDpi xmlns:a14="http://schemas.microsoft.com/office/drawing/2010/main" val="0"/>
+                  </a:ext>
+                </a:extLst>
+              </a:blip>
+              <a:srcRect/>
+              <a:stretch>
+                <a:fillRect/>
+              </a:stretch>
+            </p:blipFill>
+            <p:spPr bwMode="auto">
+              <a:xfrm>
+                <a:off x="2310365" y="756630"/>
+                <a:ext cx="1652035" cy="462570"/>
+              </a:xfrm>
+              <a:prstGeom prst="rect">
+                <a:avLst/>
+              </a:prstGeom>
+              <a:noFill/>
+              <a:ln>
+                <a:noFill/>
+              </a:ln>
+              <a:effectLst/>
+              <a:extLst>
+                <a:ext uri="{909E8E84-426E-40dd-AFC4-6F175D3DCCD1}">
+                  <a14:hiddenFill xmlns:a14="http://schemas.microsoft.com/office/drawing/2010/main">
+                    <a:solidFill>
+                      <a:schemeClr val="accent1"/>
+                    </a:solidFill>
+                  </a14:hiddenFill>
+                </a:ext>
+                <a:ext uri="{91240B29-F687-4f45-9708-019B960494DF}">
+                  <a14:hiddenLine xmlns:a14="http://schemas.microsoft.com/office/drawing/2010/main" w="9525">
+                    <a:solidFill>
+                      <a:schemeClr val="tx1"/>
+                    </a:solidFill>
+                    <a:miter lim="800000"/>
+                    <a:headEnd/>
+                    <a:tailEnd/>
+                  </a14:hiddenLine>
+                </a:ext>
+                <a:ext uri="{AF507438-7753-43e0-B8FC-AC1667EBCBE1}">
+                  <a14:hiddenEffects xmlns:a14="http://schemas.microsoft.com/office/drawing/2010/main">
+                    <a:effectLst>
+                      <a:outerShdw dist="35921" dir="2700000" algn="ctr" rotWithShape="0">
+                        <a:schemeClr val="bg2"/>
+                      </a:outerShdw>
+                    </a:effectLst>
+                  </a14:hiddenEffects>
+                </a:ext>
+              </a:extLst>
+            </p:spPr>
+          </p:pic>
+          <p:pic>
+            <p:nvPicPr>
+              <p:cNvPr id="7" name="Picture 4"/>
+              <p:cNvPicPr>
+                <a:picLocks noChangeAspect="1" noChangeArrowheads="1"/>
+              </p:cNvPicPr>
+              <p:nvPr/>
+            </p:nvPicPr>
+            <p:blipFill>
+              <a:blip r:embed="rId4">
+                <a:extLst>
+                  <a:ext uri="{28A0092B-C50C-407E-A947-70E740481C1C}">
+                    <a14:useLocalDpi xmlns:a14="http://schemas.microsoft.com/office/drawing/2010/main" val="0"/>
+                  </a:ext>
+                </a:extLst>
+              </a:blip>
+              <a:srcRect/>
+              <a:stretch>
+                <a:fillRect/>
+              </a:stretch>
+            </p:blipFill>
+            <p:spPr bwMode="auto">
+              <a:xfrm>
+                <a:off x="4419600" y="238328"/>
+                <a:ext cx="2302412" cy="436868"/>
+              </a:xfrm>
+              <a:prstGeom prst="rect">
+                <a:avLst/>
+              </a:prstGeom>
+              <a:noFill/>
+              <a:ln>
+                <a:noFill/>
+              </a:ln>
+              <a:effectLst/>
+              <a:extLst>
+                <a:ext uri="{909E8E84-426E-40dd-AFC4-6F175D3DCCD1}">
+                  <a14:hiddenFill xmlns:a14="http://schemas.microsoft.com/office/drawing/2010/main">
+                    <a:solidFill>
+                      <a:schemeClr val="accent1"/>
+                    </a:solidFill>
+                  </a14:hiddenFill>
+                </a:ext>
+                <a:ext uri="{91240B29-F687-4f45-9708-019B960494DF}">
+                  <a14:hiddenLine xmlns:a14="http://schemas.microsoft.com/office/drawing/2010/main" w="9525">
+                    <a:solidFill>
+                      <a:schemeClr val="tx1"/>
+                    </a:solidFill>
+                    <a:miter lim="800000"/>
+                    <a:headEnd/>
+                    <a:tailEnd/>
+                  </a14:hiddenLine>
+                </a:ext>
+                <a:ext uri="{AF507438-7753-43e0-B8FC-AC1667EBCBE1}">
+                  <a14:hiddenEffects xmlns:a14="http://schemas.microsoft.com/office/drawing/2010/main">
+                    <a:effectLst>
+                      <a:outerShdw dist="35921" dir="2700000" algn="ctr" rotWithShape="0">
+                        <a:schemeClr val="bg2"/>
+                      </a:outerShdw>
+                    </a:effectLst>
+                  </a14:hiddenEffects>
+                </a:ext>
+              </a:extLst>
+            </p:spPr>
+          </p:pic>
+          <p:pic>
+            <p:nvPicPr>
+              <p:cNvPr id="8" name="Picture 5"/>
+              <p:cNvPicPr>
+                <a:picLocks noChangeAspect="1" noChangeArrowheads="1"/>
+              </p:cNvPicPr>
+              <p:nvPr/>
+            </p:nvPicPr>
+            <p:blipFill>
+              <a:blip r:embed="rId5">
+                <a:extLst>
+                  <a:ext uri="{28A0092B-C50C-407E-A947-70E740481C1C}">
+                    <a14:useLocalDpi xmlns:a14="http://schemas.microsoft.com/office/drawing/2010/main" val="0"/>
+                  </a:ext>
+                </a:extLst>
+              </a:blip>
+              <a:srcRect/>
+              <a:stretch>
+                <a:fillRect/>
+              </a:stretch>
+            </p:blipFill>
+            <p:spPr bwMode="auto">
+              <a:xfrm>
+                <a:off x="4495800" y="695528"/>
+                <a:ext cx="1826320" cy="561945"/>
+              </a:xfrm>
+              <a:prstGeom prst="rect">
+                <a:avLst/>
+              </a:prstGeom>
+              <a:noFill/>
+              <a:ln>
+                <a:noFill/>
+              </a:ln>
+              <a:effectLst/>
+              <a:extLst>
+                <a:ext uri="{909E8E84-426E-40dd-AFC4-6F175D3DCCD1}">
+                  <a14:hiddenFill xmlns:a14="http://schemas.microsoft.com/office/drawing/2010/main">
+                    <a:solidFill>
+                      <a:schemeClr val="accent1"/>
+                    </a:solidFill>
+                  </a14:hiddenFill>
+                </a:ext>
+                <a:ext uri="{91240B29-F687-4f45-9708-019B960494DF}">
+                  <a14:hiddenLine xmlns:a14="http://schemas.microsoft.com/office/drawing/2010/main" w="9525">
+                    <a:solidFill>
+                      <a:schemeClr val="tx1"/>
+                    </a:solidFill>
+                    <a:miter lim="800000"/>
+                    <a:headEnd/>
+                    <a:tailEnd/>
+                  </a14:hiddenLine>
+                </a:ext>
+                <a:ext uri="{AF507438-7753-43e0-B8FC-AC1667EBCBE1}">
+                  <a14:hiddenEffects xmlns:a14="http://schemas.microsoft.com/office/drawing/2010/main">
+                    <a:effectLst>
+                      <a:outerShdw dist="35921" dir="2700000" algn="ctr" rotWithShape="0">
+                        <a:schemeClr val="bg2"/>
+                      </a:outerShdw>
+                    </a:effectLst>
+                  </a14:hiddenEffects>
+                </a:ext>
+              </a:extLst>
+            </p:spPr>
+          </p:pic>
+          <p:pic>
+            <p:nvPicPr>
+              <p:cNvPr id="9" name="Picture 9" descr="http://www.stlouisdayofdotnet.com/2012/Media/Default/Sponsors/microsoft.png"/>
+              <p:cNvPicPr>
+                <a:picLocks noChangeAspect="1" noChangeArrowheads="1"/>
+              </p:cNvPicPr>
+              <p:nvPr/>
+            </p:nvPicPr>
+            <p:blipFill>
+              <a:blip r:embed="rId6">
+                <a:extLst>
+                  <a:ext uri="{28A0092B-C50C-407E-A947-70E740481C1C}">
+                    <a14:useLocalDpi xmlns:a14="http://schemas.microsoft.com/office/drawing/2010/main" val="0"/>
+                  </a:ext>
+                </a:extLst>
+              </a:blip>
+              <a:srcRect/>
+              <a:stretch>
+                <a:fillRect/>
+              </a:stretch>
+            </p:blipFill>
+            <p:spPr bwMode="auto">
+              <a:xfrm>
+                <a:off x="2667000" y="238328"/>
+                <a:ext cx="1652035" cy="454310"/>
+              </a:xfrm>
+              <a:prstGeom prst="rect">
+                <a:avLst/>
+              </a:prstGeom>
+              <a:noFill/>
+              <a:extLst>
+                <a:ext uri="{909E8E84-426E-40dd-AFC4-6F175D3DCCD1}">
+                  <a14:hiddenFill xmlns:a14="http://schemas.microsoft.com/office/drawing/2010/main">
+                    <a:solidFill>
+                      <a:srgbClr val="FFFFFF"/>
+                    </a:solidFill>
+                  </a14:hiddenFill>
+                </a:ext>
+              </a:extLst>
+            </p:spPr>
+          </p:pic>
+          <p:pic>
+            <p:nvPicPr>
+              <p:cNvPr id="10" name="Picture 11" descr="http://www.stlouisdayofdotnet.com/2012/Media/Default/Sponsors/nokia-developer.jpg"/>
+              <p:cNvPicPr>
+                <a:picLocks noChangeAspect="1" noChangeArrowheads="1"/>
+              </p:cNvPicPr>
+              <p:nvPr/>
+            </p:nvPicPr>
+            <p:blipFill>
+              <a:blip r:embed="rId7">
+                <a:extLst>
+                  <a:ext uri="{28A0092B-C50C-407E-A947-70E740481C1C}">
+                    <a14:useLocalDpi xmlns:a14="http://schemas.microsoft.com/office/drawing/2010/main" val="0"/>
+                  </a:ext>
+                </a:extLst>
+              </a:blip>
+              <a:srcRect/>
+              <a:stretch>
+                <a:fillRect/>
+              </a:stretch>
+            </p:blipFill>
+            <p:spPr bwMode="auto">
+              <a:xfrm>
+                <a:off x="6781800" y="314528"/>
+                <a:ext cx="2048751" cy="879292"/>
+              </a:xfrm>
+              <a:prstGeom prst="rect">
+                <a:avLst/>
+              </a:prstGeom>
+              <a:noFill/>
+              <a:extLst>
+                <a:ext uri="{909E8E84-426E-40dd-AFC4-6F175D3DCCD1}">
+                  <a14:hiddenFill xmlns:a14="http://schemas.microsoft.com/office/drawing/2010/main">
+                    <a:solidFill>
+                      <a:srgbClr val="FFFFFF"/>
+                    </a:solidFill>
+                  </a14:hiddenFill>
+                </a:ext>
+              </a:extLst>
+            </p:spPr>
+          </p:pic>
+          <p:sp>
+            <p:nvSpPr>
+              <p:cNvPr id="42" name="Title 1"/>
+              <p:cNvSpPr txBox="1">
+                <a:spLocks/>
+              </p:cNvSpPr>
+              <p:nvPr/>
+            </p:nvSpPr>
+            <p:spPr>
+              <a:xfrm>
+                <a:off x="257963" y="179663"/>
+                <a:ext cx="2561437" cy="429937"/>
+              </a:xfrm>
+              <a:prstGeom prst="rect">
+                <a:avLst/>
+              </a:prstGeom>
+            </p:spPr>
+            <p:txBody>
+              <a:bodyPr lIns="68586" tIns="34294" rIns="68586" bIns="34294"/>
+              <a:lstStyle>
+                <a:lvl1pPr algn="l" defTabSz="914363" rtl="0" eaLnBrk="1" latinLnBrk="0" hangingPunct="1">
+                  <a:lnSpc>
+                    <a:spcPct val="90000"/>
+                  </a:lnSpc>
+                  <a:spcBef>
+                    <a:spcPct val="0"/>
+                  </a:spcBef>
+                  <a:buNone/>
+                  <a:defRPr lang="en-US" sz="5400" b="0" kern="1200" cap="none" spc="-100" baseline="0" dirty="0" smtClean="0">
+                    <a:ln w="3175">
+                      <a:noFill/>
+                    </a:ln>
+                    <a:gradFill>
+                      <a:gsLst>
+                        <a:gs pos="0">
+                          <a:schemeClr val="tx2"/>
+                        </a:gs>
+                        <a:gs pos="86000">
+                          <a:schemeClr val="tx2"/>
+                        </a:gs>
+                      </a:gsLst>
+                      <a:lin ang="5400000" scaled="0"/>
+                    </a:gradFill>
+                    <a:effectLst/>
+                    <a:latin typeface="Segoe UI Light" pitchFamily="34" charset="0"/>
+                    <a:ea typeface="+mn-ea"/>
+                    <a:cs typeface="Arial" charset="0"/>
+                  </a:defRPr>
+                </a:lvl1pPr>
+              </a:lstStyle>
+              <a:p>
+                <a:r>
+                  <a:rPr lang="en-US" sz="2000" b="1" spc="-70" dirty="0" smtClean="0">
+                    <a:solidFill>
+                      <a:schemeClr val="bg1">
+                        <a:lumMod val="50000"/>
+                      </a:schemeClr>
+                    </a:solidFill>
+                    <a:effectLst>
+                      <a:outerShdw blurRad="38100" dist="38100" dir="2700000" algn="tl">
+                        <a:srgbClr val="000000">
+                          <a:alpha val="43137"/>
+                        </a:srgbClr>
+                      </a:outerShdw>
+                    </a:effectLst>
+                    <a:ea typeface="Segoe UI" pitchFamily="34" charset="0"/>
+                    <a:cs typeface="Segoe UI" pitchFamily="34" charset="0"/>
+                  </a:rPr>
+                  <a:t>Platinum Sponsors</a:t>
+                </a:r>
+                <a:endParaRPr lang="en-US" sz="2000" b="1" spc="-70" dirty="0">
+                  <a:solidFill>
+                    <a:schemeClr val="bg1">
+                      <a:lumMod val="50000"/>
+                    </a:schemeClr>
+                  </a:solidFill>
+                  <a:effectLst>
+                    <a:outerShdw blurRad="38100" dist="38100" dir="2700000" algn="tl">
+                      <a:srgbClr val="000000">
+                        <a:alpha val="43137"/>
+                      </a:srgbClr>
+                    </a:outerShdw>
+                  </a:effectLst>
+                  <a:ea typeface="Segoe UI" pitchFamily="34" charset="0"/>
+                  <a:cs typeface="Segoe UI" pitchFamily="34" charset="0"/>
+                </a:endParaRPr>
+              </a:p>
+            </p:txBody>
+          </p:sp>
+        </p:grpSp>
+        <p:grpSp>
+          <p:nvGrpSpPr>
+            <p:cNvPr id="44" name="Group 43"/>
+            <p:cNvGrpSpPr/>
+            <p:nvPr/>
+          </p:nvGrpSpPr>
+          <p:grpSpPr>
+            <a:xfrm>
+              <a:off x="169091" y="5610966"/>
+              <a:ext cx="8838364" cy="1187850"/>
+              <a:chOff x="169091" y="5620694"/>
+              <a:chExt cx="8838364" cy="1187850"/>
+            </a:xfrm>
+          </p:grpSpPr>
+          <p:sp>
+            <p:nvSpPr>
+              <p:cNvPr id="40" name="Rounded Rectangle 39"/>
+              <p:cNvSpPr/>
+              <p:nvPr/>
+            </p:nvSpPr>
+            <p:spPr>
+              <a:xfrm>
+                <a:off x="169091" y="5620694"/>
+                <a:ext cx="8838364" cy="1187850"/>
+              </a:xfrm>
+              <a:prstGeom prst="roundRect">
+                <a:avLst/>
+              </a:prstGeom>
+              <a:solidFill>
+                <a:schemeClr val="tx1"/>
+              </a:solidFill>
+              <a:ln>
+                <a:solidFill>
+                  <a:srgbClr val="7030A0"/>
+                </a:solidFill>
+              </a:ln>
+              <a:effectLst>
+                <a:outerShdw blurRad="50800" dist="38100" dir="18900000" algn="bl" rotWithShape="0">
+                  <a:prstClr val="black">
+                    <a:alpha val="40000"/>
+                  </a:prstClr>
+                </a:outerShdw>
+              </a:effectLst>
+            </p:spPr>
+            <p:style>
+              <a:lnRef idx="2">
+                <a:schemeClr val="accent1">
+                  <a:shade val="50000"/>
+                </a:schemeClr>
+              </a:lnRef>
+              <a:fillRef idx="1">
+                <a:schemeClr val="accent1"/>
+              </a:fillRef>
+              <a:effectRef idx="0">
+                <a:schemeClr val="accent1"/>
+              </a:effectRef>
+              <a:fontRef idx="minor">
+                <a:schemeClr val="lt1"/>
+              </a:fontRef>
+            </p:style>
+            <p:txBody>
+              <a:bodyPr rtlCol="0" anchor="ctr"/>
+              <a:lstStyle/>
+              <a:p>
+                <a:pPr algn="ctr"/>
+                <a:endParaRPr lang="en-US"/>
+              </a:p>
+            </p:txBody>
+          </p:sp>
+          <p:pic>
+            <p:nvPicPr>
+              <p:cNvPr id="1026" name="Picture 2" descr="http://www.stlouisdayofdotnet.com/2012/Media/Default/Sponsors/discountasp.png"/>
+              <p:cNvPicPr>
+                <a:picLocks noChangeAspect="1" noChangeArrowheads="1"/>
+              </p:cNvPicPr>
+              <p:nvPr/>
+            </p:nvPicPr>
+            <p:blipFill>
+              <a:blip r:embed="rId8">
+                <a:extLst>
+                  <a:ext uri="{28A0092B-C50C-407E-A947-70E740481C1C}">
+                    <a14:useLocalDpi xmlns:a14="http://schemas.microsoft.com/office/drawing/2010/main" val="0"/>
+                  </a:ext>
+                </a:extLst>
+              </a:blip>
+              <a:srcRect/>
+              <a:stretch>
+                <a:fillRect/>
+              </a:stretch>
+            </p:blipFill>
+            <p:spPr bwMode="auto">
+              <a:xfrm>
+                <a:off x="6150262" y="5711831"/>
+                <a:ext cx="1010350" cy="540538"/>
+              </a:xfrm>
+              <a:prstGeom prst="rect">
+                <a:avLst/>
+              </a:prstGeom>
+              <a:noFill/>
+              <a:extLst>
+                <a:ext uri="{909E8E84-426E-40dd-AFC4-6F175D3DCCD1}">
+                  <a14:hiddenFill xmlns:a14="http://schemas.microsoft.com/office/drawing/2010/main">
+                    <a:solidFill>
+                      <a:srgbClr val="FFFFFF"/>
+                    </a:solidFill>
+                  </a14:hiddenFill>
+                </a:ext>
+              </a:extLst>
+            </p:spPr>
+          </p:pic>
+          <p:pic>
+            <p:nvPicPr>
+              <p:cNvPr id="1028" name="Picture 4" descr="http://www.stlouisdayofdotnet.com/2012/Media/Default/Sponsors/logicnp.png"/>
+              <p:cNvPicPr>
+                <a:picLocks noChangeAspect="1" noChangeArrowheads="1"/>
+              </p:cNvPicPr>
+              <p:nvPr/>
+            </p:nvPicPr>
+            <p:blipFill>
+              <a:blip r:embed="rId9">
+                <a:extLst>
+                  <a:ext uri="{28A0092B-C50C-407E-A947-70E740481C1C}">
+                    <a14:useLocalDpi xmlns:a14="http://schemas.microsoft.com/office/drawing/2010/main" val="0"/>
+                  </a:ext>
+                </a:extLst>
+              </a:blip>
+              <a:srcRect/>
+              <a:stretch>
+                <a:fillRect/>
+              </a:stretch>
+            </p:blipFill>
+            <p:spPr bwMode="auto">
+              <a:xfrm>
+                <a:off x="670947" y="6252369"/>
+                <a:ext cx="1858505" cy="420649"/>
+              </a:xfrm>
+              <a:prstGeom prst="rect">
+                <a:avLst/>
+              </a:prstGeom>
+              <a:noFill/>
+              <a:extLst>
+                <a:ext uri="{909E8E84-426E-40dd-AFC4-6F175D3DCCD1}">
+                  <a14:hiddenFill xmlns:a14="http://schemas.microsoft.com/office/drawing/2010/main">
+                    <a:solidFill>
+                      <a:srgbClr val="FFFFFF"/>
+                    </a:solidFill>
+                  </a14:hiddenFill>
+                </a:ext>
+              </a:extLst>
+            </p:spPr>
+          </p:pic>
+          <p:pic>
+            <p:nvPicPr>
+              <p:cNvPr id="1030" name="Picture 6" descr="http://www.stlouisdayofdotnet.com/2012/Media/Default/Sponsors/pluralsight.png"/>
+              <p:cNvPicPr>
+                <a:picLocks noChangeAspect="1" noChangeArrowheads="1"/>
+              </p:cNvPicPr>
+              <p:nvPr/>
+            </p:nvPicPr>
+            <p:blipFill>
+              <a:blip r:embed="rId10">
+                <a:extLst>
+                  <a:ext uri="{28A0092B-C50C-407E-A947-70E740481C1C}">
+                    <a14:useLocalDpi xmlns:a14="http://schemas.microsoft.com/office/drawing/2010/main" val="0"/>
+                  </a:ext>
+                </a:extLst>
+              </a:blip>
+              <a:srcRect/>
+              <a:stretch>
+                <a:fillRect/>
+              </a:stretch>
+            </p:blipFill>
+            <p:spPr bwMode="auto">
+              <a:xfrm>
+                <a:off x="2927307" y="6280070"/>
+                <a:ext cx="1720893" cy="447783"/>
+              </a:xfrm>
+              <a:prstGeom prst="rect">
+                <a:avLst/>
+              </a:prstGeom>
+              <a:noFill/>
+              <a:extLst>
+                <a:ext uri="{909E8E84-426E-40dd-AFC4-6F175D3DCCD1}">
+                  <a14:hiddenFill xmlns:a14="http://schemas.microsoft.com/office/drawing/2010/main">
+                    <a:solidFill>
+                      <a:srgbClr val="FFFFFF"/>
+                    </a:solidFill>
+                  </a14:hiddenFill>
+                </a:ext>
+              </a:extLst>
+            </p:spPr>
+          </p:pic>
+          <p:pic>
+            <p:nvPicPr>
+              <p:cNvPr id="1032" name="Picture 8" descr="http://www.stlouisdayofdotnet.com/2012/Media/Default/Sponsors/TransITions.jpg"/>
+              <p:cNvPicPr>
+                <a:picLocks noChangeAspect="1" noChangeArrowheads="1"/>
+              </p:cNvPicPr>
+              <p:nvPr/>
+            </p:nvPicPr>
+            <p:blipFill>
+              <a:blip r:embed="rId11">
+                <a:extLst>
+                  <a:ext uri="{28A0092B-C50C-407E-A947-70E740481C1C}">
+                    <a14:useLocalDpi xmlns:a14="http://schemas.microsoft.com/office/drawing/2010/main" val="0"/>
+                  </a:ext>
+                </a:extLst>
+              </a:blip>
+              <a:srcRect/>
+              <a:stretch>
+                <a:fillRect/>
+              </a:stretch>
+            </p:blipFill>
+            <p:spPr bwMode="auto">
+              <a:xfrm>
+                <a:off x="3040618" y="5704943"/>
+                <a:ext cx="1524000" cy="609600"/>
+              </a:xfrm>
+              <a:prstGeom prst="rect">
+                <a:avLst/>
+              </a:prstGeom>
+              <a:noFill/>
+              <a:extLst>
+                <a:ext uri="{909E8E84-426E-40dd-AFC4-6F175D3DCCD1}">
+                  <a14:hiddenFill xmlns:a14="http://schemas.microsoft.com/office/drawing/2010/main">
+                    <a:solidFill>
+                      <a:srgbClr val="FFFFFF"/>
+                    </a:solidFill>
+                  </a14:hiddenFill>
+                </a:ext>
+              </a:extLst>
+            </p:spPr>
+          </p:pic>
+          <p:pic>
+            <p:nvPicPr>
+              <p:cNvPr id="1034" name="Picture 10" descr="http://www.stlouisdayofdotnet.com/2012/Media/Default/Sponsors/stackoverflow.png"/>
+              <p:cNvPicPr>
+                <a:picLocks noChangeAspect="1" noChangeArrowheads="1"/>
+              </p:cNvPicPr>
+              <p:nvPr/>
+            </p:nvPicPr>
+            <p:blipFill>
+              <a:blip r:embed="rId12">
+                <a:extLst>
+                  <a:ext uri="{28A0092B-C50C-407E-A947-70E740481C1C}">
+                    <a14:useLocalDpi xmlns:a14="http://schemas.microsoft.com/office/drawing/2010/main" val="0"/>
+                  </a:ext>
+                </a:extLst>
+              </a:blip>
+              <a:srcRect/>
+              <a:stretch>
+                <a:fillRect/>
+              </a:stretch>
+            </p:blipFill>
+            <p:spPr bwMode="auto">
+              <a:xfrm>
+                <a:off x="5046014" y="6092786"/>
+                <a:ext cx="2252372" cy="635067"/>
+              </a:xfrm>
+              <a:prstGeom prst="rect">
+                <a:avLst/>
+              </a:prstGeom>
+              <a:noFill/>
+              <a:extLst>
+                <a:ext uri="{909E8E84-426E-40dd-AFC4-6F175D3DCCD1}">
+                  <a14:hiddenFill xmlns:a14="http://schemas.microsoft.com/office/drawing/2010/main">
+                    <a:solidFill>
+                      <a:srgbClr val="FFFFFF"/>
+                    </a:solidFill>
+                  </a14:hiddenFill>
+                </a:ext>
+              </a:extLst>
+            </p:spPr>
+          </p:pic>
+          <p:sp>
+            <p:nvSpPr>
+              <p:cNvPr id="53" name="Title 1"/>
+              <p:cNvSpPr txBox="1">
+                <a:spLocks/>
+              </p:cNvSpPr>
+              <p:nvPr/>
+            </p:nvSpPr>
+            <p:spPr>
+              <a:xfrm>
+                <a:off x="369961" y="5782511"/>
+                <a:ext cx="2678039" cy="303592"/>
+              </a:xfrm>
+              <a:prstGeom prst="rect">
+                <a:avLst/>
+              </a:prstGeom>
+            </p:spPr>
+            <p:txBody>
+              <a:bodyPr lIns="68586" tIns="34294" rIns="68586" bIns="34294"/>
+              <a:lstStyle>
+                <a:lvl1pPr algn="l" defTabSz="914363" rtl="0" eaLnBrk="1" latinLnBrk="0" hangingPunct="1">
+                  <a:lnSpc>
+                    <a:spcPct val="90000"/>
+                  </a:lnSpc>
+                  <a:spcBef>
+                    <a:spcPct val="0"/>
+                  </a:spcBef>
+                  <a:buNone/>
+                  <a:defRPr lang="en-US" sz="5400" b="0" kern="1200" cap="none" spc="-100" baseline="0" dirty="0" smtClean="0">
+                    <a:ln w="3175">
+                      <a:noFill/>
+                    </a:ln>
+                    <a:gradFill>
+                      <a:gsLst>
+                        <a:gs pos="0">
+                          <a:schemeClr val="tx2"/>
+                        </a:gs>
+                        <a:gs pos="86000">
+                          <a:schemeClr val="tx2"/>
+                        </a:gs>
+                      </a:gsLst>
+                      <a:lin ang="5400000" scaled="0"/>
+                    </a:gradFill>
+                    <a:effectLst/>
+                    <a:latin typeface="Segoe UI Light" pitchFamily="34" charset="0"/>
+                    <a:ea typeface="+mn-ea"/>
+                    <a:cs typeface="Arial" charset="0"/>
+                  </a:defRPr>
+                </a:lvl1pPr>
+              </a:lstStyle>
+              <a:p>
+                <a:r>
+                  <a:rPr lang="en-US" sz="2000" b="1" spc="-70" dirty="0" smtClean="0">
+                    <a:solidFill>
+                      <a:schemeClr val="bg1">
+                        <a:lumMod val="50000"/>
+                      </a:schemeClr>
+                    </a:solidFill>
+                    <a:effectLst>
+                      <a:outerShdw blurRad="38100" dist="38100" dir="2700000" algn="tl">
+                        <a:srgbClr val="000000">
+                          <a:alpha val="43137"/>
+                        </a:srgbClr>
+                      </a:outerShdw>
+                    </a:effectLst>
+                    <a:ea typeface="Segoe UI" pitchFamily="34" charset="0"/>
+                    <a:cs typeface="Segoe UI" pitchFamily="34" charset="0"/>
+                  </a:rPr>
+                  <a:t>Silver Sponsors</a:t>
+                </a:r>
+                <a:endParaRPr lang="en-US" sz="2000" b="1" spc="-70" dirty="0">
+                  <a:solidFill>
+                    <a:schemeClr val="bg1">
+                      <a:lumMod val="50000"/>
+                    </a:schemeClr>
+                  </a:solidFill>
+                  <a:effectLst>
+                    <a:outerShdw blurRad="38100" dist="38100" dir="2700000" algn="tl">
+                      <a:srgbClr val="000000">
+                        <a:alpha val="43137"/>
+                      </a:srgbClr>
+                    </a:outerShdw>
+                  </a:effectLst>
+                  <a:ea typeface="Segoe UI" pitchFamily="34" charset="0"/>
+                  <a:cs typeface="Segoe UI" pitchFamily="34" charset="0"/>
+                </a:endParaRPr>
+              </a:p>
+            </p:txBody>
+          </p:sp>
+        </p:grpSp>
+        <p:grpSp>
+          <p:nvGrpSpPr>
+            <p:cNvPr id="49" name="Group 48"/>
+            <p:cNvGrpSpPr/>
+            <p:nvPr/>
+          </p:nvGrpSpPr>
+          <p:grpSpPr>
+            <a:xfrm>
+              <a:off x="123216" y="1543456"/>
+              <a:ext cx="8915400" cy="3948849"/>
+              <a:chOff x="123216" y="1617952"/>
+              <a:chExt cx="8915400" cy="3948849"/>
+            </a:xfrm>
+          </p:grpSpPr>
+          <p:sp>
+            <p:nvSpPr>
+              <p:cNvPr id="39" name="Rounded Rectangle 38"/>
+              <p:cNvSpPr/>
+              <p:nvPr/>
+            </p:nvSpPr>
+            <p:spPr>
+              <a:xfrm>
+                <a:off x="123216" y="1617952"/>
+                <a:ext cx="8915400" cy="3948849"/>
+              </a:xfrm>
+              <a:prstGeom prst="roundRect">
+                <a:avLst/>
+              </a:prstGeom>
+              <a:solidFill>
+                <a:schemeClr val="tx1"/>
+              </a:solidFill>
+              <a:ln>
+                <a:solidFill>
+                  <a:srgbClr val="7030A0"/>
+                </a:solidFill>
+              </a:ln>
+              <a:effectLst>
+                <a:outerShdw blurRad="50800" dist="38100" dir="18900000" algn="bl" rotWithShape="0">
+                  <a:prstClr val="black">
+                    <a:alpha val="40000"/>
+                  </a:prstClr>
+                </a:outerShdw>
+              </a:effectLst>
+            </p:spPr>
+            <p:style>
+              <a:lnRef idx="2">
+                <a:schemeClr val="accent1">
+                  <a:shade val="50000"/>
+                </a:schemeClr>
+              </a:lnRef>
+              <a:fillRef idx="1">
+                <a:schemeClr val="accent1"/>
+              </a:fillRef>
+              <a:effectRef idx="0">
+                <a:schemeClr val="accent1"/>
+              </a:effectRef>
+              <a:fontRef idx="minor">
+                <a:schemeClr val="lt1"/>
+              </a:fontRef>
+            </p:style>
+            <p:txBody>
+              <a:bodyPr rtlCol="0" anchor="ctr"/>
+              <a:lstStyle/>
+              <a:p>
+                <a:pPr algn="ctr"/>
+                <a:endParaRPr lang="en-US"/>
+              </a:p>
+            </p:txBody>
+          </p:sp>
+          <p:pic>
+            <p:nvPicPr>
+              <p:cNvPr id="12" name="Picture 4" descr="http://www.stlouisdayofdotnet.com/2012/Media/Default/Sponsors/equifax.png"/>
+              <p:cNvPicPr>
+                <a:picLocks noChangeAspect="1" noChangeArrowheads="1"/>
+              </p:cNvPicPr>
+              <p:nvPr/>
+            </p:nvPicPr>
+            <p:blipFill>
+              <a:blip r:embed="rId13">
+                <a:extLst>
+                  <a:ext uri="{28A0092B-C50C-407E-A947-70E740481C1C}">
+                    <a14:useLocalDpi xmlns:a14="http://schemas.microsoft.com/office/drawing/2010/main" val="0"/>
+                  </a:ext>
+                </a:extLst>
+              </a:blip>
+              <a:srcRect/>
+              <a:stretch>
+                <a:fillRect/>
+              </a:stretch>
+            </p:blipFill>
+            <p:spPr bwMode="auto">
+              <a:xfrm>
+                <a:off x="1981200" y="2286000"/>
+                <a:ext cx="1847723" cy="420381"/>
+              </a:xfrm>
+              <a:prstGeom prst="rect">
+                <a:avLst/>
+              </a:prstGeom>
+              <a:noFill/>
+              <a:extLst>
+                <a:ext uri="{909E8E84-426E-40dd-AFC4-6F175D3DCCD1}">
+                  <a14:hiddenFill xmlns:a14="http://schemas.microsoft.com/office/drawing/2010/main">
+                    <a:solidFill>
+                      <a:srgbClr val="FFFFFF"/>
+                    </a:solidFill>
+                  </a14:hiddenFill>
+                </a:ext>
+              </a:extLst>
+            </p:spPr>
+          </p:pic>
+          <p:pic>
+            <p:nvPicPr>
+              <p:cNvPr id="14" name="Picture 8" descr="http://www.stlouisdayofdotnet.com/2012/Media/Default/Sponsors/architectnow.jpg"/>
+              <p:cNvPicPr>
+                <a:picLocks noChangeAspect="1" noChangeArrowheads="1"/>
+              </p:cNvPicPr>
+              <p:nvPr/>
+            </p:nvPicPr>
+            <p:blipFill>
+              <a:blip r:embed="rId14">
+                <a:extLst>
+                  <a:ext uri="{28A0092B-C50C-407E-A947-70E740481C1C}">
+                    <a14:useLocalDpi xmlns:a14="http://schemas.microsoft.com/office/drawing/2010/main" val="0"/>
+                  </a:ext>
+                </a:extLst>
+              </a:blip>
+              <a:srcRect/>
+              <a:stretch>
+                <a:fillRect/>
+              </a:stretch>
+            </p:blipFill>
+            <p:spPr bwMode="auto">
+              <a:xfrm>
+                <a:off x="176283" y="2446424"/>
+                <a:ext cx="1148222" cy="1052538"/>
+              </a:xfrm>
+              <a:prstGeom prst="rect">
+                <a:avLst/>
+              </a:prstGeom>
+              <a:noFill/>
+              <a:extLst>
+                <a:ext uri="{909E8E84-426E-40dd-AFC4-6F175D3DCCD1}">
+                  <a14:hiddenFill xmlns:a14="http://schemas.microsoft.com/office/drawing/2010/main">
+                    <a:solidFill>
+                      <a:srgbClr val="FFFFFF"/>
+                    </a:solidFill>
+                  </a14:hiddenFill>
+                </a:ext>
+              </a:extLst>
+            </p:spPr>
+          </p:pic>
+          <p:pic>
+            <p:nvPicPr>
+              <p:cNvPr id="13" name="Picture 6" descr="http://www.stlouisdayofdotnet.com/2012/Media/Default/Sponsors/talentporte.png"/>
+              <p:cNvPicPr>
+                <a:picLocks noChangeAspect="1" noChangeArrowheads="1"/>
+              </p:cNvPicPr>
+              <p:nvPr/>
+            </p:nvPicPr>
+            <p:blipFill>
+              <a:blip r:embed="rId15">
+                <a:extLst>
+                  <a:ext uri="{28A0092B-C50C-407E-A947-70E740481C1C}">
+                    <a14:useLocalDpi xmlns:a14="http://schemas.microsoft.com/office/drawing/2010/main" val="0"/>
+                  </a:ext>
+                </a:extLst>
+              </a:blip>
+              <a:srcRect/>
+              <a:stretch>
+                <a:fillRect/>
+              </a:stretch>
+            </p:blipFill>
+            <p:spPr bwMode="auto">
+              <a:xfrm>
+                <a:off x="7298386" y="4258248"/>
+                <a:ext cx="1583678" cy="475103"/>
+              </a:xfrm>
+              <a:prstGeom prst="rect">
+                <a:avLst/>
+              </a:prstGeom>
+              <a:noFill/>
+              <a:extLst>
+                <a:ext uri="{909E8E84-426E-40dd-AFC4-6F175D3DCCD1}">
+                  <a14:hiddenFill xmlns:a14="http://schemas.microsoft.com/office/drawing/2010/main">
+                    <a:solidFill>
+                      <a:srgbClr val="FFFFFF"/>
+                    </a:solidFill>
+                  </a14:hiddenFill>
+                </a:ext>
+              </a:extLst>
+            </p:spPr>
+          </p:pic>
+          <p:pic>
+            <p:nvPicPr>
+              <p:cNvPr id="16" name="Picture 12" descr="http://www.stlouisdayofdotnet.com/2012/Media/Default/Sponsors/vantagelinks.png"/>
+              <p:cNvPicPr>
+                <a:picLocks noChangeAspect="1" noChangeArrowheads="1"/>
+              </p:cNvPicPr>
+              <p:nvPr/>
+            </p:nvPicPr>
+            <p:blipFill>
+              <a:blip r:embed="rId16">
+                <a:extLst>
+                  <a:ext uri="{28A0092B-C50C-407E-A947-70E740481C1C}">
+                    <a14:useLocalDpi xmlns:a14="http://schemas.microsoft.com/office/drawing/2010/main" val="0"/>
+                  </a:ext>
+                </a:extLst>
+              </a:blip>
+              <a:srcRect/>
+              <a:stretch>
+                <a:fillRect/>
+              </a:stretch>
+            </p:blipFill>
+            <p:spPr bwMode="auto">
+              <a:xfrm>
+                <a:off x="8092446" y="2264343"/>
+                <a:ext cx="899154" cy="953103"/>
+              </a:xfrm>
+              <a:prstGeom prst="rect">
+                <a:avLst/>
+              </a:prstGeom>
+              <a:noFill/>
+              <a:extLst>
+                <a:ext uri="{909E8E84-426E-40dd-AFC4-6F175D3DCCD1}">
+                  <a14:hiddenFill xmlns:a14="http://schemas.microsoft.com/office/drawing/2010/main">
+                    <a:solidFill>
+                      <a:srgbClr val="FFFFFF"/>
+                    </a:solidFill>
+                  </a14:hiddenFill>
+                </a:ext>
+              </a:extLst>
+            </p:spPr>
+          </p:pic>
+          <p:pic>
+            <p:nvPicPr>
+              <p:cNvPr id="15" name="Picture 10" descr="http://www.stlouisdayofdotnet.com/2012/Media/Default/Sponsors/ctp.png"/>
+              <p:cNvPicPr>
+                <a:picLocks noChangeAspect="1" noChangeArrowheads="1"/>
+              </p:cNvPicPr>
+              <p:nvPr/>
+            </p:nvPicPr>
+            <p:blipFill>
+              <a:blip r:embed="rId17">
+                <a:extLst>
+                  <a:ext uri="{28A0092B-C50C-407E-A947-70E740481C1C}">
+                    <a14:useLocalDpi xmlns:a14="http://schemas.microsoft.com/office/drawing/2010/main" val="0"/>
+                  </a:ext>
+                </a:extLst>
+              </a:blip>
+              <a:srcRect/>
+              <a:stretch>
+                <a:fillRect/>
+              </a:stretch>
+            </p:blipFill>
+            <p:spPr bwMode="auto">
+              <a:xfrm>
+                <a:off x="5086084" y="4953000"/>
+                <a:ext cx="2152916" cy="516699"/>
+              </a:xfrm>
+              <a:prstGeom prst="rect">
+                <a:avLst/>
+              </a:prstGeom>
+              <a:noFill/>
+              <a:extLst>
+                <a:ext uri="{909E8E84-426E-40dd-AFC4-6F175D3DCCD1}">
+                  <a14:hiddenFill xmlns:a14="http://schemas.microsoft.com/office/drawing/2010/main">
+                    <a:solidFill>
+                      <a:srgbClr val="FFFFFF"/>
+                    </a:solidFill>
+                  </a14:hiddenFill>
+                </a:ext>
+              </a:extLst>
+            </p:spPr>
+          </p:pic>
+          <p:pic>
+            <p:nvPicPr>
+              <p:cNvPr id="17" name="Picture 14" descr="http://www.stlouisdayofdotnet.com/2012/Media/Default/Sponsors/kellymitchell.png"/>
+              <p:cNvPicPr>
+                <a:picLocks noChangeAspect="1" noChangeArrowheads="1"/>
+              </p:cNvPicPr>
+              <p:nvPr/>
+            </p:nvPicPr>
+            <p:blipFill>
+              <a:blip r:embed="rId18">
+                <a:extLst>
+                  <a:ext uri="{28A0092B-C50C-407E-A947-70E740481C1C}">
+                    <a14:useLocalDpi xmlns:a14="http://schemas.microsoft.com/office/drawing/2010/main" val="0"/>
+                  </a:ext>
+                </a:extLst>
+              </a:blip>
+              <a:srcRect/>
+              <a:stretch>
+                <a:fillRect/>
+              </a:stretch>
+            </p:blipFill>
+            <p:spPr bwMode="auto">
+              <a:xfrm>
+                <a:off x="3733800" y="1827096"/>
+                <a:ext cx="2489975" cy="310228"/>
+              </a:xfrm>
+              <a:prstGeom prst="rect">
+                <a:avLst/>
+              </a:prstGeom>
+              <a:noFill/>
+              <a:extLst>
+                <a:ext uri="{909E8E84-426E-40dd-AFC4-6F175D3DCCD1}">
+                  <a14:hiddenFill xmlns:a14="http://schemas.microsoft.com/office/drawing/2010/main">
+                    <a:solidFill>
+                      <a:srgbClr val="FFFFFF"/>
+                    </a:solidFill>
+                  </a14:hiddenFill>
+                </a:ext>
+              </a:extLst>
+            </p:spPr>
+          </p:pic>
+          <p:pic>
+            <p:nvPicPr>
+              <p:cNvPr id="18" name="Picture 16" descr="http://www.stlouisdayofdotnet.com/2012/Media/Default/Sponsors/daugherty.gif"/>
+              <p:cNvPicPr>
+                <a:picLocks noChangeAspect="1" noChangeArrowheads="1"/>
+              </p:cNvPicPr>
+              <p:nvPr/>
+            </p:nvPicPr>
+            <p:blipFill>
+              <a:blip r:embed="rId19">
+                <a:extLst>
+                  <a:ext uri="{28A0092B-C50C-407E-A947-70E740481C1C}">
+                    <a14:useLocalDpi xmlns:a14="http://schemas.microsoft.com/office/drawing/2010/main" val="0"/>
+                  </a:ext>
+                </a:extLst>
+              </a:blip>
+              <a:srcRect/>
+              <a:stretch>
+                <a:fillRect/>
+              </a:stretch>
+            </p:blipFill>
+            <p:spPr bwMode="auto">
+              <a:xfrm>
+                <a:off x="1295400" y="3436761"/>
+                <a:ext cx="1693084" cy="601839"/>
+              </a:xfrm>
+              <a:prstGeom prst="rect">
+                <a:avLst/>
+              </a:prstGeom>
+              <a:noFill/>
+              <a:extLst>
+                <a:ext uri="{909E8E84-426E-40dd-AFC4-6F175D3DCCD1}">
+                  <a14:hiddenFill xmlns:a14="http://schemas.microsoft.com/office/drawing/2010/main">
+                    <a:solidFill>
+                      <a:srgbClr val="FFFFFF"/>
+                    </a:solidFill>
+                  </a14:hiddenFill>
+                </a:ext>
+              </a:extLst>
+            </p:spPr>
+          </p:pic>
+          <p:pic>
+            <p:nvPicPr>
+              <p:cNvPr id="21" name="Picture 22" descr="http://www.stlouisdayofdotnet.com/2012/Media/Default/Sponsors/componentone.png"/>
+              <p:cNvPicPr>
+                <a:picLocks noChangeAspect="1" noChangeArrowheads="1"/>
+              </p:cNvPicPr>
+              <p:nvPr/>
+            </p:nvPicPr>
+            <p:blipFill>
+              <a:blip r:embed="rId20">
+                <a:extLst>
+                  <a:ext uri="{28A0092B-C50C-407E-A947-70E740481C1C}">
+                    <a14:useLocalDpi xmlns:a14="http://schemas.microsoft.com/office/drawing/2010/main" val="0"/>
+                  </a:ext>
+                </a:extLst>
+              </a:blip>
+              <a:srcRect/>
+              <a:stretch>
+                <a:fillRect/>
+              </a:stretch>
+            </p:blipFill>
+            <p:spPr bwMode="auto">
+              <a:xfrm>
+                <a:off x="6257039" y="1755412"/>
+                <a:ext cx="2343176" cy="531120"/>
+              </a:xfrm>
+              <a:prstGeom prst="rect">
+                <a:avLst/>
+              </a:prstGeom>
+              <a:noFill/>
+              <a:extLst>
+                <a:ext uri="{909E8E84-426E-40dd-AFC4-6F175D3DCCD1}">
+                  <a14:hiddenFill xmlns:a14="http://schemas.microsoft.com/office/drawing/2010/main">
+                    <a:solidFill>
+                      <a:srgbClr val="FFFFFF"/>
+                    </a:solidFill>
+                  </a14:hiddenFill>
+                </a:ext>
+              </a:extLst>
+            </p:spPr>
+          </p:pic>
+          <p:pic>
+            <p:nvPicPr>
+              <p:cNvPr id="22" name="Picture 24" descr="http://www.stlouisdayofdotnet.com/2012/Media/Default/Sponsors/busyevent.png"/>
+              <p:cNvPicPr>
+                <a:picLocks noChangeAspect="1" noChangeArrowheads="1"/>
+              </p:cNvPicPr>
+              <p:nvPr/>
+            </p:nvPicPr>
+            <p:blipFill>
+              <a:blip r:embed="rId21">
+                <a:extLst>
+                  <a:ext uri="{28A0092B-C50C-407E-A947-70E740481C1C}">
+                    <a14:useLocalDpi xmlns:a14="http://schemas.microsoft.com/office/drawing/2010/main" val="0"/>
+                  </a:ext>
+                </a:extLst>
+              </a:blip>
+              <a:srcRect/>
+              <a:stretch>
+                <a:fillRect/>
+              </a:stretch>
+            </p:blipFill>
+            <p:spPr bwMode="auto">
+              <a:xfrm>
+                <a:off x="6547978" y="3065663"/>
+                <a:ext cx="770871" cy="593405"/>
+              </a:xfrm>
+              <a:prstGeom prst="rect">
+                <a:avLst/>
+              </a:prstGeom>
+              <a:noFill/>
+              <a:extLst>
+                <a:ext uri="{909E8E84-426E-40dd-AFC4-6F175D3DCCD1}">
+                  <a14:hiddenFill xmlns:a14="http://schemas.microsoft.com/office/drawing/2010/main">
+                    <a:solidFill>
+                      <a:srgbClr val="FFFFFF"/>
+                    </a:solidFill>
+                  </a14:hiddenFill>
+                </a:ext>
+              </a:extLst>
+            </p:spPr>
+          </p:pic>
+          <p:pic>
+            <p:nvPicPr>
+              <p:cNvPr id="23" name="Picture 26" descr="http://www.stlouisdayofdotnet.com/2012/Media/Default/Sponsors/fastsearch.jpg"/>
+              <p:cNvPicPr>
+                <a:picLocks noChangeAspect="1" noChangeArrowheads="1"/>
+              </p:cNvPicPr>
+              <p:nvPr/>
+            </p:nvPicPr>
+            <p:blipFill>
+              <a:blip r:embed="rId22" cstate="print">
+                <a:extLst>
+                  <a:ext uri="{28A0092B-C50C-407E-A947-70E740481C1C}">
+                    <a14:useLocalDpi xmlns:a14="http://schemas.microsoft.com/office/drawing/2010/main" val="0"/>
+                  </a:ext>
+                </a:extLst>
+              </a:blip>
+              <a:srcRect/>
+              <a:stretch>
+                <a:fillRect/>
+              </a:stretch>
+            </p:blipFill>
+            <p:spPr bwMode="auto">
+              <a:xfrm>
+                <a:off x="7363570" y="2345528"/>
+                <a:ext cx="797422" cy="621991"/>
+              </a:xfrm>
+              <a:prstGeom prst="rect">
+                <a:avLst/>
+              </a:prstGeom>
+              <a:noFill/>
+              <a:extLst>
+                <a:ext uri="{909E8E84-426E-40dd-AFC4-6F175D3DCCD1}">
+                  <a14:hiddenFill xmlns:a14="http://schemas.microsoft.com/office/drawing/2010/main">
+                    <a:solidFill>
+                      <a:srgbClr val="FFFFFF"/>
+                    </a:solidFill>
+                  </a14:hiddenFill>
+                </a:ext>
+              </a:extLst>
+            </p:spPr>
+          </p:pic>
+          <p:pic>
+            <p:nvPicPr>
+              <p:cNvPr id="24" name="Picture 28" descr="http://www.stlouisdayofdotnet.com/2012/Media/Default/Sponsors/washuit.jpg"/>
+              <p:cNvPicPr>
+                <a:picLocks noChangeAspect="1" noChangeArrowheads="1"/>
+              </p:cNvPicPr>
+              <p:nvPr/>
+            </p:nvPicPr>
+            <p:blipFill>
+              <a:blip r:embed="rId23">
+                <a:extLst>
+                  <a:ext uri="{28A0092B-C50C-407E-A947-70E740481C1C}">
+                    <a14:useLocalDpi xmlns:a14="http://schemas.microsoft.com/office/drawing/2010/main" val="0"/>
+                  </a:ext>
+                </a:extLst>
+              </a:blip>
+              <a:srcRect/>
+              <a:stretch>
+                <a:fillRect/>
+              </a:stretch>
+            </p:blipFill>
+            <p:spPr bwMode="auto">
+              <a:xfrm>
+                <a:off x="3200400" y="2836446"/>
+                <a:ext cx="1342463" cy="774499"/>
+              </a:xfrm>
+              <a:prstGeom prst="rect">
+                <a:avLst/>
+              </a:prstGeom>
+              <a:noFill/>
+              <a:extLst>
+                <a:ext uri="{909E8E84-426E-40dd-AFC4-6F175D3DCCD1}">
+                  <a14:hiddenFill xmlns:a14="http://schemas.microsoft.com/office/drawing/2010/main">
+                    <a:solidFill>
+                      <a:srgbClr val="FFFFFF"/>
+                    </a:solidFill>
+                  </a14:hiddenFill>
+                </a:ext>
+              </a:extLst>
+            </p:spPr>
+          </p:pic>
+          <p:pic>
+            <p:nvPicPr>
+              <p:cNvPr id="25" name="Picture 30" descr="http://www.stlouisdayofdotnet.com/2012/Media/Default/Sponsors/AdvancedResources.jpg"/>
+              <p:cNvPicPr>
+                <a:picLocks noChangeAspect="1" noChangeArrowheads="1"/>
+              </p:cNvPicPr>
+              <p:nvPr/>
+            </p:nvPicPr>
+            <p:blipFill>
+              <a:blip r:embed="rId24">
+                <a:extLst>
+                  <a:ext uri="{28A0092B-C50C-407E-A947-70E740481C1C}">
+                    <a14:useLocalDpi xmlns:a14="http://schemas.microsoft.com/office/drawing/2010/main" val="0"/>
+                  </a:ext>
+                </a:extLst>
+              </a:blip>
+              <a:srcRect/>
+              <a:stretch>
+                <a:fillRect/>
+              </a:stretch>
+            </p:blipFill>
+            <p:spPr bwMode="auto">
+              <a:xfrm>
+                <a:off x="738832" y="5035052"/>
+                <a:ext cx="1784229" cy="444349"/>
+              </a:xfrm>
+              <a:prstGeom prst="rect">
+                <a:avLst/>
+              </a:prstGeom>
+              <a:noFill/>
+              <a:extLst>
+                <a:ext uri="{909E8E84-426E-40dd-AFC4-6F175D3DCCD1}">
+                  <a14:hiddenFill xmlns:a14="http://schemas.microsoft.com/office/drawing/2010/main">
+                    <a:solidFill>
+                      <a:srgbClr val="FFFFFF"/>
+                    </a:solidFill>
+                  </a14:hiddenFill>
+                </a:ext>
+              </a:extLst>
+            </p:spPr>
+          </p:pic>
+          <p:pic>
+            <p:nvPicPr>
+              <p:cNvPr id="27" name="Picture 34" descr="http://www.stlouisdayofdotnet.com/2012/Media/Default/Sponsors/preferredresources.jpg"/>
+              <p:cNvPicPr>
+                <a:picLocks noChangeAspect="1" noChangeArrowheads="1"/>
+              </p:cNvPicPr>
+              <p:nvPr/>
+            </p:nvPicPr>
+            <p:blipFill>
+              <a:blip r:embed="rId25">
+                <a:extLst>
+                  <a:ext uri="{28A0092B-C50C-407E-A947-70E740481C1C}">
+                    <a14:useLocalDpi xmlns:a14="http://schemas.microsoft.com/office/drawing/2010/main" val="0"/>
+                  </a:ext>
+                </a:extLst>
+              </a:blip>
+              <a:srcRect/>
+              <a:stretch>
+                <a:fillRect/>
+              </a:stretch>
+            </p:blipFill>
+            <p:spPr bwMode="auto">
+              <a:xfrm>
+                <a:off x="2827675" y="4953000"/>
+                <a:ext cx="2002495" cy="510636"/>
+              </a:xfrm>
+              <a:prstGeom prst="rect">
+                <a:avLst/>
+              </a:prstGeom>
+              <a:noFill/>
+              <a:extLst>
+                <a:ext uri="{909E8E84-426E-40dd-AFC4-6F175D3DCCD1}">
+                  <a14:hiddenFill xmlns:a14="http://schemas.microsoft.com/office/drawing/2010/main">
+                    <a:solidFill>
+                      <a:srgbClr val="FFFFFF"/>
+                    </a:solidFill>
+                  </a14:hiddenFill>
+                </a:ext>
+              </a:extLst>
+            </p:spPr>
+          </p:pic>
+          <p:pic>
+            <p:nvPicPr>
+              <p:cNvPr id="29" name="Picture 38" descr="http://www.stlouisdayofdotnet.com/2012/Media/Default/Sponsors/ungerboeck.png"/>
+              <p:cNvPicPr>
+                <a:picLocks noChangeAspect="1" noChangeArrowheads="1"/>
+              </p:cNvPicPr>
+              <p:nvPr/>
+            </p:nvPicPr>
+            <p:blipFill>
+              <a:blip r:embed="rId26">
+                <a:extLst>
+                  <a:ext uri="{28A0092B-C50C-407E-A947-70E740481C1C}">
+                    <a14:useLocalDpi xmlns:a14="http://schemas.microsoft.com/office/drawing/2010/main" val="0"/>
+                  </a:ext>
+                </a:extLst>
+              </a:blip>
+              <a:srcRect/>
+              <a:stretch>
+                <a:fillRect/>
+              </a:stretch>
+            </p:blipFill>
+            <p:spPr bwMode="auto">
+              <a:xfrm>
+                <a:off x="1361872" y="2797534"/>
+                <a:ext cx="1715726" cy="533175"/>
+              </a:xfrm>
+              <a:prstGeom prst="rect">
+                <a:avLst/>
+              </a:prstGeom>
+              <a:noFill/>
+              <a:extLst>
+                <a:ext uri="{909E8E84-426E-40dd-AFC4-6F175D3DCCD1}">
+                  <a14:hiddenFill xmlns:a14="http://schemas.microsoft.com/office/drawing/2010/main">
+                    <a:solidFill>
+                      <a:srgbClr val="FFFFFF"/>
+                    </a:solidFill>
+                  </a14:hiddenFill>
+                </a:ext>
+              </a:extLst>
+            </p:spPr>
+          </p:pic>
+          <p:pic>
+            <p:nvPicPr>
+              <p:cNvPr id="30" name="Picture 40" descr="http://www.stlouisdayofdotnet.com/2012/Media/Default/Sponsors/byrne-software.jpg"/>
+              <p:cNvPicPr>
+                <a:picLocks noChangeAspect="1" noChangeArrowheads="1"/>
+              </p:cNvPicPr>
+              <p:nvPr/>
+            </p:nvPicPr>
+            <p:blipFill>
+              <a:blip r:embed="rId27">
+                <a:extLst>
+                  <a:ext uri="{28A0092B-C50C-407E-A947-70E740481C1C}">
+                    <a14:useLocalDpi xmlns:a14="http://schemas.microsoft.com/office/drawing/2010/main" val="0"/>
+                  </a:ext>
+                </a:extLst>
+              </a:blip>
+              <a:srcRect/>
+              <a:stretch>
+                <a:fillRect/>
+              </a:stretch>
+            </p:blipFill>
+            <p:spPr bwMode="auto">
+              <a:xfrm>
+                <a:off x="2362200" y="1750896"/>
+                <a:ext cx="1197684" cy="441543"/>
+              </a:xfrm>
+              <a:prstGeom prst="rect">
+                <a:avLst/>
+              </a:prstGeom>
+              <a:noFill/>
+              <a:extLst>
+                <a:ext uri="{909E8E84-426E-40dd-AFC4-6F175D3DCCD1}">
+                  <a14:hiddenFill xmlns:a14="http://schemas.microsoft.com/office/drawing/2010/main">
+                    <a:solidFill>
+                      <a:srgbClr val="FFFFFF"/>
+                    </a:solidFill>
+                  </a14:hiddenFill>
+                </a:ext>
+              </a:extLst>
+            </p:spPr>
+          </p:pic>
+          <p:pic>
+            <p:nvPicPr>
+              <p:cNvPr id="31" name="Picture 42" descr="http://www.stlouisdayofdotnet.com/2012/Media/Default/Sponsors/PerceptiveSoftware.jpg"/>
+              <p:cNvPicPr>
+                <a:picLocks noChangeAspect="1" noChangeArrowheads="1"/>
+              </p:cNvPicPr>
+              <p:nvPr/>
+            </p:nvPicPr>
+            <p:blipFill>
+              <a:blip r:embed="rId28">
+                <a:extLst>
+                  <a:ext uri="{28A0092B-C50C-407E-A947-70E740481C1C}">
+                    <a14:useLocalDpi xmlns:a14="http://schemas.microsoft.com/office/drawing/2010/main" val="0"/>
+                  </a:ext>
+                </a:extLst>
+              </a:blip>
+              <a:srcRect/>
+              <a:stretch>
+                <a:fillRect/>
+              </a:stretch>
+            </p:blipFill>
+            <p:spPr bwMode="auto">
+              <a:xfrm>
+                <a:off x="3799864" y="2209800"/>
+                <a:ext cx="2292992" cy="607991"/>
+              </a:xfrm>
+              <a:prstGeom prst="rect">
+                <a:avLst/>
+              </a:prstGeom>
+              <a:noFill/>
+              <a:extLst>
+                <a:ext uri="{909E8E84-426E-40dd-AFC4-6F175D3DCCD1}">
+                  <a14:hiddenFill xmlns:a14="http://schemas.microsoft.com/office/drawing/2010/main">
+                    <a:solidFill>
+                      <a:srgbClr val="FFFFFF"/>
+                    </a:solidFill>
+                  </a14:hiddenFill>
+                </a:ext>
+              </a:extLst>
+            </p:spPr>
+          </p:pic>
+          <p:pic>
+            <p:nvPicPr>
+              <p:cNvPr id="32" name="Picture 44" descr="http://www.stlouisdayofdotnet.com/2012/Media/Default/Sponsors/LRS.jpg"/>
+              <p:cNvPicPr>
+                <a:picLocks noChangeAspect="1" noChangeArrowheads="1"/>
+              </p:cNvPicPr>
+              <p:nvPr/>
+            </p:nvPicPr>
+            <p:blipFill>
+              <a:blip r:embed="rId29">
+                <a:extLst>
+                  <a:ext uri="{28A0092B-C50C-407E-A947-70E740481C1C}">
+                    <a14:useLocalDpi xmlns:a14="http://schemas.microsoft.com/office/drawing/2010/main" val="0"/>
+                  </a:ext>
+                </a:extLst>
+              </a:blip>
+              <a:srcRect/>
+              <a:stretch>
+                <a:fillRect/>
+              </a:stretch>
+            </p:blipFill>
+            <p:spPr bwMode="auto">
+              <a:xfrm>
+                <a:off x="299578" y="3581400"/>
+                <a:ext cx="778645" cy="573739"/>
+              </a:xfrm>
+              <a:prstGeom prst="rect">
+                <a:avLst/>
+              </a:prstGeom>
+              <a:noFill/>
+              <a:extLst>
+                <a:ext uri="{909E8E84-426E-40dd-AFC4-6F175D3DCCD1}">
+                  <a14:hiddenFill xmlns:a14="http://schemas.microsoft.com/office/drawing/2010/main">
+                    <a:solidFill>
+                      <a:srgbClr val="FFFFFF"/>
+                    </a:solidFill>
+                  </a14:hiddenFill>
+                </a:ext>
+              </a:extLst>
+            </p:spPr>
+          </p:pic>
+          <p:pic>
+            <p:nvPicPr>
+              <p:cNvPr id="34" name="Picture 48" descr="http://www.stlouisdayofdotnet.com/2012/Media/Default/Sponsors/xiolink.jpg"/>
+              <p:cNvPicPr>
+                <a:picLocks noChangeAspect="1" noChangeArrowheads="1"/>
+              </p:cNvPicPr>
+              <p:nvPr/>
+            </p:nvPicPr>
+            <p:blipFill>
+              <a:blip r:embed="rId30">
+                <a:extLst>
+                  <a:ext uri="{28A0092B-C50C-407E-A947-70E740481C1C}">
+                    <a14:useLocalDpi xmlns:a14="http://schemas.microsoft.com/office/drawing/2010/main" val="0"/>
+                  </a:ext>
+                </a:extLst>
+              </a:blip>
+              <a:srcRect/>
+              <a:stretch>
+                <a:fillRect/>
+              </a:stretch>
+            </p:blipFill>
+            <p:spPr bwMode="auto">
+              <a:xfrm>
+                <a:off x="6366119" y="2345528"/>
+                <a:ext cx="720481" cy="455345"/>
+              </a:xfrm>
+              <a:prstGeom prst="rect">
+                <a:avLst/>
+              </a:prstGeom>
+              <a:noFill/>
+              <a:extLst>
+                <a:ext uri="{909E8E84-426E-40dd-AFC4-6F175D3DCCD1}">
+                  <a14:hiddenFill xmlns:a14="http://schemas.microsoft.com/office/drawing/2010/main">
+                    <a:solidFill>
+                      <a:srgbClr val="FFFFFF"/>
+                    </a:solidFill>
+                  </a14:hiddenFill>
+                </a:ext>
+              </a:extLst>
+            </p:spPr>
+          </p:pic>
+          <p:sp>
+            <p:nvSpPr>
+              <p:cNvPr id="41" name="Title 1"/>
+              <p:cNvSpPr txBox="1">
+                <a:spLocks/>
+              </p:cNvSpPr>
+              <p:nvPr/>
+            </p:nvSpPr>
+            <p:spPr>
+              <a:xfrm>
+                <a:off x="457200" y="1759918"/>
+                <a:ext cx="1849789" cy="457200"/>
+              </a:xfrm>
+              <a:prstGeom prst="rect">
+                <a:avLst/>
+              </a:prstGeom>
+            </p:spPr>
+            <p:txBody>
+              <a:bodyPr lIns="68586" tIns="34294" rIns="68586" bIns="34294"/>
+              <a:lstStyle>
+                <a:lvl1pPr algn="l" defTabSz="914363" rtl="0" eaLnBrk="1" latinLnBrk="0" hangingPunct="1">
+                  <a:lnSpc>
+                    <a:spcPct val="90000"/>
+                  </a:lnSpc>
+                  <a:spcBef>
+                    <a:spcPct val="0"/>
+                  </a:spcBef>
+                  <a:buNone/>
+                  <a:defRPr lang="en-US" sz="5400" b="0" kern="1200" cap="none" spc="-100" baseline="0" dirty="0" smtClean="0">
+                    <a:ln w="3175">
+                      <a:noFill/>
+                    </a:ln>
+                    <a:gradFill>
+                      <a:gsLst>
+                        <a:gs pos="0">
+                          <a:schemeClr val="tx2"/>
+                        </a:gs>
+                        <a:gs pos="86000">
+                          <a:schemeClr val="tx2"/>
+                        </a:gs>
+                      </a:gsLst>
+                      <a:lin ang="5400000" scaled="0"/>
+                    </a:gradFill>
+                    <a:effectLst/>
+                    <a:latin typeface="Segoe UI Light" pitchFamily="34" charset="0"/>
+                    <a:ea typeface="+mn-ea"/>
+                    <a:cs typeface="Arial" charset="0"/>
+                  </a:defRPr>
+                </a:lvl1pPr>
+              </a:lstStyle>
+              <a:p>
+                <a:r>
+                  <a:rPr lang="en-US" sz="2000" b="1" spc="-70" dirty="0" smtClean="0">
+                    <a:solidFill>
+                      <a:schemeClr val="bg1">
+                        <a:lumMod val="50000"/>
+                      </a:schemeClr>
+                    </a:solidFill>
+                    <a:effectLst>
+                      <a:outerShdw blurRad="38100" dist="38100" dir="2700000" algn="tl">
+                        <a:srgbClr val="000000">
+                          <a:alpha val="43137"/>
+                        </a:srgbClr>
+                      </a:outerShdw>
+                    </a:effectLst>
+                    <a:ea typeface="Segoe UI" pitchFamily="34" charset="0"/>
+                    <a:cs typeface="Segoe UI" pitchFamily="34" charset="0"/>
+                  </a:rPr>
+                  <a:t>Gold Sponsors</a:t>
+                </a:r>
+                <a:endParaRPr lang="en-US" sz="2000" b="1" spc="-70" dirty="0">
+                  <a:solidFill>
+                    <a:schemeClr val="bg1">
+                      <a:lumMod val="50000"/>
+                    </a:schemeClr>
+                  </a:solidFill>
+                  <a:effectLst>
+                    <a:outerShdw blurRad="38100" dist="38100" dir="2700000" algn="tl">
+                      <a:srgbClr val="000000">
+                        <a:alpha val="43137"/>
+                      </a:srgbClr>
+                    </a:outerShdw>
+                  </a:effectLst>
+                  <a:ea typeface="Segoe UI" pitchFamily="34" charset="0"/>
+                  <a:cs typeface="Segoe UI" pitchFamily="34" charset="0"/>
+                </a:endParaRPr>
+              </a:p>
+            </p:txBody>
+          </p:sp>
+          <p:pic>
+            <p:nvPicPr>
+              <p:cNvPr id="52" name="Picture 51" descr="http://www.stlouisdayofdotnet.com/2012/Media/Default/Sponsors/scottrade.png"/>
+              <p:cNvPicPr>
+                <a:picLocks noChangeAspect="1" noChangeArrowheads="1"/>
+              </p:cNvPicPr>
+              <p:nvPr/>
+            </p:nvPicPr>
+            <p:blipFill>
+              <a:blip r:embed="rId31">
+                <a:extLst>
+                  <a:ext uri="{28A0092B-C50C-407E-A947-70E740481C1C}">
+                    <a14:useLocalDpi xmlns:a14="http://schemas.microsoft.com/office/drawing/2010/main" val="0"/>
+                  </a:ext>
+                </a:extLst>
+              </a:blip>
+              <a:srcRect/>
+              <a:stretch>
+                <a:fillRect/>
+              </a:stretch>
+            </p:blipFill>
+            <p:spPr bwMode="auto">
+              <a:xfrm>
+                <a:off x="4801214" y="3413759"/>
+                <a:ext cx="1514807" cy="454443"/>
+              </a:xfrm>
+              <a:prstGeom prst="rect">
+                <a:avLst/>
+              </a:prstGeom>
+              <a:noFill/>
+              <a:extLst>
+                <a:ext uri="{909E8E84-426E-40dd-AFC4-6F175D3DCCD1}">
+                  <a14:hiddenFill xmlns:a14="http://schemas.microsoft.com/office/drawing/2010/main">
+                    <a:solidFill>
+                      <a:srgbClr val="FFFFFF"/>
+                    </a:solidFill>
+                  </a14:hiddenFill>
+                </a:ext>
+              </a:extLst>
+            </p:spPr>
+          </p:pic>
+          <p:pic>
+            <p:nvPicPr>
+              <p:cNvPr id="54" name="Picture 46" descr="http://www.stlouisdayofdotnet.com/2012/Media/Default/Sponsors/MissouriState.png"/>
+              <p:cNvPicPr>
+                <a:picLocks noChangeAspect="1" noChangeArrowheads="1"/>
+              </p:cNvPicPr>
+              <p:nvPr/>
+            </p:nvPicPr>
+            <p:blipFill>
+              <a:blip r:embed="rId32">
+                <a:extLst>
+                  <a:ext uri="{28A0092B-C50C-407E-A947-70E740481C1C}">
+                    <a14:useLocalDpi xmlns:a14="http://schemas.microsoft.com/office/drawing/2010/main" val="0"/>
+                  </a:ext>
+                </a:extLst>
+              </a:blip>
+              <a:srcRect/>
+              <a:stretch>
+                <a:fillRect/>
+              </a:stretch>
+            </p:blipFill>
+            <p:spPr bwMode="auto">
+              <a:xfrm>
+                <a:off x="4723378" y="2819400"/>
+                <a:ext cx="1824600" cy="512862"/>
+              </a:xfrm>
+              <a:prstGeom prst="rect">
+                <a:avLst/>
+              </a:prstGeom>
+              <a:noFill/>
+              <a:extLst>
+                <a:ext uri="{909E8E84-426E-40dd-AFC4-6F175D3DCCD1}">
+                  <a14:hiddenFill xmlns:a14="http://schemas.microsoft.com/office/drawing/2010/main">
+                    <a:solidFill>
+                      <a:srgbClr val="FFFFFF"/>
+                    </a:solidFill>
+                  </a14:hiddenFill>
+                </a:ext>
+              </a:extLst>
+            </p:spPr>
+          </p:pic>
+          <p:pic>
+            <p:nvPicPr>
+              <p:cNvPr id="58" name="Picture 57" descr="http://www.stlouisdayofdotnet.com/2012/Media/Default/Sponsors/telerik.png"/>
+              <p:cNvPicPr>
+                <a:picLocks noChangeAspect="1" noChangeArrowheads="1"/>
+              </p:cNvPicPr>
+              <p:nvPr/>
+            </p:nvPicPr>
+            <p:blipFill>
+              <a:blip r:embed="rId33">
+                <a:extLst>
+                  <a:ext uri="{28A0092B-C50C-407E-A947-70E740481C1C}">
+                    <a14:useLocalDpi xmlns:a14="http://schemas.microsoft.com/office/drawing/2010/main" val="0"/>
+                  </a:ext>
+                </a:extLst>
+              </a:blip>
+              <a:srcRect/>
+              <a:stretch>
+                <a:fillRect/>
+              </a:stretch>
+            </p:blipFill>
+            <p:spPr bwMode="auto">
+              <a:xfrm>
+                <a:off x="7298386" y="4791137"/>
+                <a:ext cx="1413998" cy="487830"/>
+              </a:xfrm>
+              <a:prstGeom prst="rect">
+                <a:avLst/>
+              </a:prstGeom>
+              <a:noFill/>
+              <a:extLst>
+                <a:ext uri="{909E8E84-426E-40dd-AFC4-6F175D3DCCD1}">
+                  <a14:hiddenFill xmlns:a14="http://schemas.microsoft.com/office/drawing/2010/main">
+                    <a:solidFill>
+                      <a:srgbClr val="FFFFFF"/>
+                    </a:solidFill>
+                  </a14:hiddenFill>
+                </a:ext>
+              </a:extLst>
+            </p:spPr>
+          </p:pic>
+          <p:pic>
+            <p:nvPicPr>
+              <p:cNvPr id="59" name="Picture 32" descr="http://www.stlouisdayofdotnet.com/2012/Media/Default/Sponsors/infragistics.png"/>
+              <p:cNvPicPr>
+                <a:picLocks noChangeAspect="1" noChangeArrowheads="1"/>
+              </p:cNvPicPr>
+              <p:nvPr/>
+            </p:nvPicPr>
+            <p:blipFill>
+              <a:blip r:embed="rId34">
+                <a:extLst>
+                  <a:ext uri="{28A0092B-C50C-407E-A947-70E740481C1C}">
+                    <a14:useLocalDpi xmlns:a14="http://schemas.microsoft.com/office/drawing/2010/main" val="0"/>
+                  </a:ext>
+                </a:extLst>
+              </a:blip>
+              <a:srcRect/>
+              <a:stretch>
+                <a:fillRect/>
+              </a:stretch>
+            </p:blipFill>
+            <p:spPr bwMode="auto">
+              <a:xfrm>
+                <a:off x="5009673" y="3999761"/>
+                <a:ext cx="2166365" cy="496039"/>
+              </a:xfrm>
+              <a:prstGeom prst="rect">
+                <a:avLst/>
+              </a:prstGeom>
+              <a:noFill/>
+              <a:extLst>
+                <a:ext uri="{909E8E84-426E-40dd-AFC4-6F175D3DCCD1}">
+                  <a14:hiddenFill xmlns:a14="http://schemas.microsoft.com/office/drawing/2010/main">
+                    <a:solidFill>
+                      <a:srgbClr val="FFFFFF"/>
+                    </a:solidFill>
+                  </a14:hiddenFill>
+                </a:ext>
+              </a:extLst>
+            </p:spPr>
+          </p:pic>
+          <p:pic>
+            <p:nvPicPr>
+              <p:cNvPr id="60" name="Picture 36" descr="http://www.stlouisdayofdotnet.com/2012/Media/Default/Sponsors/cait.gif"/>
+              <p:cNvPicPr>
+                <a:picLocks noChangeAspect="1" noChangeArrowheads="1"/>
+              </p:cNvPicPr>
+              <p:nvPr/>
+            </p:nvPicPr>
+            <p:blipFill>
+              <a:blip r:embed="rId35">
+                <a:extLst>
+                  <a:ext uri="{28A0092B-C50C-407E-A947-70E740481C1C}">
+                    <a14:useLocalDpi xmlns:a14="http://schemas.microsoft.com/office/drawing/2010/main" val="0"/>
+                  </a:ext>
+                </a:extLst>
+              </a:blip>
+              <a:srcRect/>
+              <a:stretch>
+                <a:fillRect/>
+              </a:stretch>
+            </p:blipFill>
+            <p:spPr bwMode="auto">
+              <a:xfrm>
+                <a:off x="2084816" y="4212307"/>
+                <a:ext cx="2177162" cy="544290"/>
+              </a:xfrm>
+              <a:prstGeom prst="rect">
+                <a:avLst/>
+              </a:prstGeom>
+              <a:noFill/>
+              <a:extLst>
+                <a:ext uri="{909E8E84-426E-40dd-AFC4-6F175D3DCCD1}">
+                  <a14:hiddenFill xmlns:a14="http://schemas.microsoft.com/office/drawing/2010/main">
+                    <a:solidFill>
+                      <a:srgbClr val="FFFFFF"/>
+                    </a:solidFill>
+                  </a14:hiddenFill>
+                </a:ext>
+              </a:extLst>
+            </p:spPr>
+          </p:pic>
+          <p:pic>
+            <p:nvPicPr>
+              <p:cNvPr id="61" name="Picture 50" descr="http://www.stlouisdayofdotnet.com/2012/Media/Default/Sponsors/adaptivesg.jpg"/>
+              <p:cNvPicPr>
+                <a:picLocks noChangeAspect="1" noChangeArrowheads="1"/>
+              </p:cNvPicPr>
+              <p:nvPr/>
+            </p:nvPicPr>
+            <p:blipFill>
+              <a:blip r:embed="rId36">
+                <a:extLst>
+                  <a:ext uri="{28A0092B-C50C-407E-A947-70E740481C1C}">
+                    <a14:useLocalDpi xmlns:a14="http://schemas.microsoft.com/office/drawing/2010/main" val="0"/>
+                  </a:ext>
+                </a:extLst>
+              </a:blip>
+              <a:srcRect/>
+              <a:stretch>
+                <a:fillRect/>
+              </a:stretch>
+            </p:blipFill>
+            <p:spPr bwMode="auto">
+              <a:xfrm>
+                <a:off x="4492827" y="4563917"/>
+                <a:ext cx="1978951" cy="389083"/>
+              </a:xfrm>
+              <a:prstGeom prst="rect">
+                <a:avLst/>
+              </a:prstGeom>
+              <a:noFill/>
+              <a:extLst>
+                <a:ext uri="{909E8E84-426E-40dd-AFC4-6F175D3DCCD1}">
+                  <a14:hiddenFill xmlns:a14="http://schemas.microsoft.com/office/drawing/2010/main">
+                    <a:solidFill>
+                      <a:srgbClr val="FFFFFF"/>
+                    </a:solidFill>
+                  </a14:hiddenFill>
+                </a:ext>
+              </a:extLst>
+            </p:spPr>
+          </p:pic>
+          <p:pic>
+            <p:nvPicPr>
+              <p:cNvPr id="46" name="Picture 2" descr="http://www.stlouisdayofdotnet.com/2012/Media/Default/Sponsors/centriq.png"/>
+              <p:cNvPicPr>
+                <a:picLocks noChangeAspect="1" noChangeArrowheads="1"/>
+              </p:cNvPicPr>
+              <p:nvPr/>
+            </p:nvPicPr>
+            <p:blipFill>
+              <a:blip r:embed="rId37">
+                <a:extLst>
+                  <a:ext uri="{28A0092B-C50C-407E-A947-70E740481C1C}">
+                    <a14:useLocalDpi xmlns:a14="http://schemas.microsoft.com/office/drawing/2010/main" val="0"/>
+                  </a:ext>
+                </a:extLst>
+              </a:blip>
+              <a:srcRect/>
+              <a:stretch>
+                <a:fillRect/>
+              </a:stretch>
+            </p:blipFill>
+            <p:spPr bwMode="auto">
+              <a:xfrm>
+                <a:off x="3166135" y="3692775"/>
+                <a:ext cx="1414024" cy="650625"/>
+              </a:xfrm>
+              <a:prstGeom prst="rect">
+                <a:avLst/>
+              </a:prstGeom>
+              <a:noFill/>
+              <a:extLst>
+                <a:ext uri="{909E8E84-426E-40dd-AFC4-6F175D3DCCD1}">
+                  <a14:hiddenFill xmlns:a14="http://schemas.microsoft.com/office/drawing/2010/main">
+                    <a:solidFill>
+                      <a:srgbClr val="FFFFFF"/>
+                    </a:solidFill>
+                  </a14:hiddenFill>
+                </a:ext>
+              </a:extLst>
+            </p:spPr>
+          </p:pic>
+          <p:pic>
+            <p:nvPicPr>
+              <p:cNvPr id="47" name="Picture 4" descr="http://www.stlouisdayofdotnet.com/2012/Media/Default/Sponsors/TDKtechnologies.png"/>
+              <p:cNvPicPr>
+                <a:picLocks noChangeAspect="1" noChangeArrowheads="1"/>
+              </p:cNvPicPr>
+              <p:nvPr/>
+            </p:nvPicPr>
+            <p:blipFill>
+              <a:blip r:embed="rId38">
+                <a:extLst>
+                  <a:ext uri="{28A0092B-C50C-407E-A947-70E740481C1C}">
+                    <a14:useLocalDpi xmlns:a14="http://schemas.microsoft.com/office/drawing/2010/main" val="0"/>
+                  </a:ext>
+                </a:extLst>
+              </a:blip>
+              <a:srcRect/>
+              <a:stretch>
+                <a:fillRect/>
+              </a:stretch>
+            </p:blipFill>
+            <p:spPr bwMode="auto">
+              <a:xfrm>
+                <a:off x="7330385" y="3473093"/>
+                <a:ext cx="1661215" cy="672792"/>
+              </a:xfrm>
+              <a:prstGeom prst="rect">
+                <a:avLst/>
+              </a:prstGeom>
+              <a:noFill/>
+              <a:extLst>
+                <a:ext uri="{909E8E84-426E-40dd-AFC4-6F175D3DCCD1}">
+                  <a14:hiddenFill xmlns:a14="http://schemas.microsoft.com/office/drawing/2010/main">
+                    <a:solidFill>
+                      <a:srgbClr val="FFFFFF"/>
+                    </a:solidFill>
+                  </a14:hiddenFill>
+                </a:ext>
+              </a:extLst>
+            </p:spPr>
+          </p:pic>
+          <p:pic>
+            <p:nvPicPr>
+              <p:cNvPr id="48" name="Picture 6" descr="http://www.stlouisdayofdotnet.com/2012/Media/Default/Sponsors/Twilio.png"/>
+              <p:cNvPicPr>
+                <a:picLocks noChangeAspect="1" noChangeArrowheads="1"/>
+              </p:cNvPicPr>
+              <p:nvPr/>
+            </p:nvPicPr>
+            <p:blipFill>
+              <a:blip r:embed="rId39">
+                <a:extLst>
+                  <a:ext uri="{28A0092B-C50C-407E-A947-70E740481C1C}">
+                    <a14:useLocalDpi xmlns:a14="http://schemas.microsoft.com/office/drawing/2010/main" val="0"/>
+                  </a:ext>
+                </a:extLst>
+              </a:blip>
+              <a:srcRect/>
+              <a:stretch>
+                <a:fillRect/>
+              </a:stretch>
+            </p:blipFill>
+            <p:spPr bwMode="auto">
+              <a:xfrm>
+                <a:off x="263835" y="4213671"/>
+                <a:ext cx="1628775" cy="542926"/>
+              </a:xfrm>
+              <a:prstGeom prst="rect">
+                <a:avLst/>
+              </a:prstGeom>
+              <a:noFill/>
+              <a:extLst>
+                <a:ext uri="{909E8E84-426E-40dd-AFC4-6F175D3DCCD1}">
+                  <a14:hiddenFill xmlns:a14="http://schemas.microsoft.com/office/drawing/2010/main">
+                    <a:solidFill>
+                      <a:srgbClr val="FFFFFF"/>
+                    </a:solidFill>
+                  </a14:hiddenFill>
+                </a:ext>
+              </a:extLst>
+            </p:spPr>
+          </p:pic>
+          <p:pic>
+            <p:nvPicPr>
+              <p:cNvPr id="11" name="Picture 2" descr="http://www.stlouisdayofdotnet.com/2012/Media/Default/Sponsors/perficient.png"/>
+              <p:cNvPicPr>
+                <a:picLocks noChangeAspect="1" noChangeArrowheads="1"/>
+              </p:cNvPicPr>
+              <p:nvPr/>
+            </p:nvPicPr>
+            <p:blipFill>
+              <a:blip r:embed="rId40">
+                <a:extLst>
+                  <a:ext uri="{28A0092B-C50C-407E-A947-70E740481C1C}">
+                    <a14:useLocalDpi xmlns:a14="http://schemas.microsoft.com/office/drawing/2010/main" val="0"/>
+                  </a:ext>
+                </a:extLst>
+              </a:blip>
+              <a:srcRect/>
+              <a:stretch>
+                <a:fillRect/>
+              </a:stretch>
+            </p:blipFill>
+            <p:spPr bwMode="auto">
+              <a:xfrm>
+                <a:off x="815765" y="2127412"/>
+                <a:ext cx="1068927" cy="468570"/>
+              </a:xfrm>
+              <a:prstGeom prst="rect">
+                <a:avLst/>
+              </a:prstGeom>
+              <a:noFill/>
+              <a:extLst>
+                <a:ext uri="{909E8E84-426E-40dd-AFC4-6F175D3DCCD1}">
+                  <a14:hiddenFill xmlns:a14="http://schemas.microsoft.com/office/drawing/2010/main">
+                    <a:solidFill>
+                      <a:srgbClr val="FFFFFF"/>
+                    </a:solidFill>
+                  </a14:hiddenFill>
+                </a:ext>
+              </a:extLst>
+            </p:spPr>
+          </p:pic>
+        </p:grpSp>
+      </p:grpSp>
     </p:spTree>
+    <p:extLst>
+      <p:ext uri="{BB962C8B-B14F-4D97-AF65-F5344CB8AC3E}">
+        <p14:creationId xmlns:p14="http://schemas.microsoft.com/office/powerpoint/2010/main" val="506335957"/>
+      </p:ext>
+    </p:extLst>
   </p:cSld>
   <p:clrMapOvr>
     <a:masterClrMapping/>
   </p:clrMapOvr>
-  <p:transition>
+  <p:transition xmlns:p14="http://schemas.microsoft.com/office/powerpoint/2010/main">
     <p:fade/>
   </p:transition>
   <p:timing>
     <p:tnLst>
       <p:par>
-        <p:cTn id="1" dur="indefinite" restart="never" nodeType="tmRoot"/>
+        <p:cTn xmlns:p14="http://schemas.microsoft.com/office/powerpoint/2010/main" id="1" dur="indefinite" restart="never" nodeType="tmRoot"/>
       </p:par>
     </p:tnLst>
   </p:timing>
@@ -7282,14 +9004,19 @@
             <p:ph type="title"/>
           </p:nvPr>
         </p:nvSpPr>
-        <p:spPr/>
+        <p:spPr>
+          <a:xfrm>
+            <a:off x="381000" y="228600"/>
+            <a:ext cx="8382000" cy="769441"/>
+          </a:xfrm>
+        </p:spPr>
         <p:txBody>
           <a:bodyPr/>
           <a:lstStyle/>
           <a:p>
             <a:r>
               <a:rPr lang="en-US" b="1" dirty="0" smtClean="0"/>
-              <a:t>Info</a:t>
+              <a:t>Goal</a:t>
             </a:r>
             <a:endParaRPr lang="en-US" b="1" dirty="0"/>
           </a:p>
@@ -7307,88 +9034,55 @@
         </p:nvSpPr>
         <p:spPr>
           <a:xfrm>
-            <a:off x="381002" y="1417638"/>
-            <a:ext cx="8410575" cy="2899255"/>
+            <a:off x="366713" y="2196868"/>
+            <a:ext cx="8410575" cy="2907462"/>
           </a:xfrm>
         </p:spPr>
         <p:txBody>
           <a:bodyPr/>
           <a:lstStyle/>
           <a:p>
-            <a:r>
-              <a:rPr lang="en-US" dirty="0" smtClean="0"/>
-              <a:t>javier@lozanotek.com</a:t>
-            </a:r>
-          </a:p>
-          <a:p>
-            <a:r>
-              <a:rPr lang="en-US" dirty="0" smtClean="0"/>
-              <a:t>@</a:t>
-            </a:r>
-            <a:r>
-              <a:rPr lang="en-US" dirty="0" err="1" smtClean="0"/>
-              <a:t>jglozano</a:t>
-            </a:r>
-            <a:endParaRPr lang="en-US" dirty="0" smtClean="0"/>
-          </a:p>
-          <a:p>
-            <a:r>
-              <a:rPr lang="en-US" dirty="0" smtClean="0"/>
-              <a:t>http://lozanotek.com/blog</a:t>
-            </a:r>
-          </a:p>
-          <a:p>
-            <a:endParaRPr lang="en-US" dirty="0" smtClean="0"/>
-          </a:p>
-          <a:p>
-            <a:r>
-              <a:rPr lang="en-US" dirty="0" smtClean="0"/>
-              <a:t>http://github.com/lozanotek/advancedmvc</a:t>
-            </a:r>
-          </a:p>
-        </p:txBody>
-      </p:sp>
-      <p:sp>
-        <p:nvSpPr>
-          <p:cNvPr id="4" name="Slide Number Placeholder 3"/>
-          <p:cNvSpPr>
-            <a:spLocks noGrp="1"/>
-          </p:cNvSpPr>
-          <p:nvPr>
-            <p:ph type="sldNum" sz="quarter" idx="10"/>
-          </p:nvPr>
-        </p:nvSpPr>
-        <p:spPr/>
-        <p:txBody>
-          <a:bodyPr/>
-          <a:lstStyle/>
-          <a:p>
-            <a:pPr>
-              <a:defRPr/>
+            <a:pPr marL="0" indent="0">
+              <a:buNone/>
             </a:pPr>
-            <a:fld id="{B63753EC-566D-40B0-951D-58F31B9256E5}" type="slidenum">
-              <a:rPr lang="en-US" smtClean="0"/>
-              <a:pPr>
-                <a:defRPr/>
-              </a:pPr>
-              <a:t>3</a:t>
-            </a:fld>
-            <a:endParaRPr lang="en-US"/>
+            <a:r>
+              <a:rPr lang="en-US" b="1" i="1" dirty="0" smtClean="0"/>
+              <a:t>For you to start thinking differently about ASP.NET MVC.  If the feature doesn’t come ‘out of the box’, it doesn’t </a:t>
+            </a:r>
+            <a:r>
+              <a:rPr lang="en-US" b="1" i="1" dirty="0" smtClean="0"/>
+              <a:t>mean it’s not possible to do.</a:t>
+            </a:r>
+          </a:p>
+          <a:p>
+            <a:pPr marL="0" indent="0">
+              <a:buNone/>
+            </a:pPr>
+            <a:r>
+              <a:rPr lang="en-US" b="1" i="1" dirty="0" smtClean="0"/>
+              <a:t>Learn to ‘exploit’ the framework to do more for you…</a:t>
+            </a:r>
+            <a:endParaRPr lang="en-US" b="1" i="1" dirty="0" smtClean="0"/>
           </a:p>
         </p:txBody>
       </p:sp>
     </p:spTree>
+    <p:extLst>
+      <p:ext uri="{BB962C8B-B14F-4D97-AF65-F5344CB8AC3E}">
+        <p14:creationId xmlns:p14="http://schemas.microsoft.com/office/powerpoint/2010/main" val="2131827383"/>
+      </p:ext>
+    </p:extLst>
   </p:cSld>
   <p:clrMapOvr>
     <a:masterClrMapping/>
   </p:clrMapOvr>
-  <p:transition>
+  <p:transition xmlns:p14="http://schemas.microsoft.com/office/powerpoint/2010/main">
     <p:fade/>
   </p:transition>
   <p:timing>
     <p:tnLst>
       <p:par>
-        <p:cTn id="1" dur="indefinite" restart="never" nodeType="tmRoot"/>
+        <p:cTn xmlns:p14="http://schemas.microsoft.com/office/powerpoint/2010/main" id="1" dur="indefinite" restart="never" nodeType="tmRoot"/>
       </p:par>
     </p:tnLst>
   </p:timing>
@@ -7429,6 +9123,493 @@
           <a:p>
             <a:r>
               <a:rPr lang="en-US" b="1" dirty="0" smtClean="0"/>
+              <a:t>Agenda</a:t>
+            </a:r>
+            <a:endParaRPr lang="en-US" b="1" dirty="0"/>
+          </a:p>
+        </p:txBody>
+      </p:sp>
+      <p:sp>
+        <p:nvSpPr>
+          <p:cNvPr id="3" name="Content Placeholder 2"/>
+          <p:cNvSpPr>
+            <a:spLocks noGrp="1"/>
+          </p:cNvSpPr>
+          <p:nvPr>
+            <p:ph idx="1"/>
+          </p:nvPr>
+        </p:nvSpPr>
+        <p:spPr>
+          <a:xfrm>
+            <a:off x="381002" y="1417638"/>
+            <a:ext cx="8410575" cy="2907462"/>
+          </a:xfrm>
+        </p:spPr>
+        <p:txBody>
+          <a:bodyPr/>
+          <a:lstStyle/>
+          <a:p>
+            <a:r>
+              <a:rPr lang="en-US" dirty="0" smtClean="0"/>
+              <a:t>Inferred </a:t>
+            </a:r>
+            <a:r>
+              <a:rPr lang="en-US" dirty="0" smtClean="0"/>
+              <a:t>Actions</a:t>
+            </a:r>
+          </a:p>
+          <a:p>
+            <a:r>
+              <a:rPr lang="en-US" dirty="0" smtClean="0"/>
+              <a:t>POCO Results</a:t>
+            </a:r>
+          </a:p>
+          <a:p>
+            <a:r>
+              <a:rPr lang="en-US" dirty="0" smtClean="0"/>
+              <a:t>Custom Results</a:t>
+            </a:r>
+          </a:p>
+          <a:p>
+            <a:r>
+              <a:rPr lang="en-US" dirty="0" smtClean="0"/>
+              <a:t>Dynamic Page Views</a:t>
+            </a:r>
+          </a:p>
+          <a:p>
+            <a:r>
+              <a:rPr lang="en-US" dirty="0" smtClean="0"/>
+              <a:t>??</a:t>
+            </a:r>
+          </a:p>
+        </p:txBody>
+      </p:sp>
+    </p:spTree>
+  </p:cSld>
+  <p:clrMapOvr>
+    <a:masterClrMapping/>
+  </p:clrMapOvr>
+  <p:transition xmlns:p14="http://schemas.microsoft.com/office/powerpoint/2010/main">
+    <p:fade/>
+  </p:transition>
+  <p:timing>
+    <p:tnLst>
+      <p:par>
+        <p:cTn xmlns:p14="http://schemas.microsoft.com/office/powerpoint/2010/main" id="1" dur="indefinite" restart="never" nodeType="tmRoot"/>
+      </p:par>
+    </p:tnLst>
+  </p:timing>
+</p:sld>
+</file>
+
+<file path=ppt/slides/slide5.xml><?xml version="1.0" encoding="utf-8"?>
+<p:sld xmlns:a="http://schemas.openxmlformats.org/drawingml/2006/main" xmlns:r="http://schemas.openxmlformats.org/officeDocument/2006/relationships" xmlns:p="http://schemas.openxmlformats.org/presentationml/2006/main">
+  <p:cSld>
+    <p:spTree>
+      <p:nvGrpSpPr>
+        <p:cNvPr id="1" name=""/>
+        <p:cNvGrpSpPr/>
+        <p:nvPr/>
+      </p:nvGrpSpPr>
+      <p:grpSpPr>
+        <a:xfrm>
+          <a:off x="0" y="0"/>
+          <a:ext cx="0" cy="0"/>
+          <a:chOff x="0" y="0"/>
+          <a:chExt cx="0" cy="0"/>
+        </a:xfrm>
+      </p:grpSpPr>
+      <p:sp>
+        <p:nvSpPr>
+          <p:cNvPr id="2" name="Title 1"/>
+          <p:cNvSpPr>
+            <a:spLocks noGrp="1"/>
+          </p:cNvSpPr>
+          <p:nvPr>
+            <p:ph type="title"/>
+          </p:nvPr>
+        </p:nvSpPr>
+        <p:spPr/>
+        <p:txBody>
+          <a:bodyPr/>
+          <a:lstStyle/>
+          <a:p>
+            <a:r>
+              <a:rPr lang="en-US" b="1" dirty="0" smtClean="0"/>
+              <a:t>Info</a:t>
+            </a:r>
+            <a:endParaRPr lang="en-US" b="1" dirty="0"/>
+          </a:p>
+        </p:txBody>
+      </p:sp>
+      <p:sp>
+        <p:nvSpPr>
+          <p:cNvPr id="3" name="Content Placeholder 2"/>
+          <p:cNvSpPr>
+            <a:spLocks noGrp="1"/>
+          </p:cNvSpPr>
+          <p:nvPr>
+            <p:ph idx="1"/>
+          </p:nvPr>
+        </p:nvSpPr>
+        <p:spPr>
+          <a:xfrm>
+            <a:off x="381002" y="1417638"/>
+            <a:ext cx="8410575" cy="1725601"/>
+          </a:xfrm>
+        </p:spPr>
+        <p:txBody>
+          <a:bodyPr/>
+          <a:lstStyle/>
+          <a:p>
+            <a:pPr marL="0" indent="0">
+              <a:buNone/>
+            </a:pPr>
+            <a:r>
+              <a:rPr lang="en-US" b="1" dirty="0" smtClean="0"/>
+              <a:t>javier@lozanotek.com</a:t>
+            </a:r>
+          </a:p>
+          <a:p>
+            <a:pPr marL="0" indent="0">
+              <a:buNone/>
+            </a:pPr>
+            <a:r>
+              <a:rPr lang="en-US" b="1" dirty="0" smtClean="0"/>
+              <a:t>@jglozano</a:t>
+            </a:r>
+          </a:p>
+          <a:p>
+            <a:pPr marL="0" indent="0">
+              <a:buNone/>
+            </a:pPr>
+            <a:r>
+              <a:rPr lang="en-US" b="1" dirty="0" smtClean="0">
+                <a:hlinkClick r:id="rId2"/>
+              </a:rPr>
+              <a:t>http://lozanotek.com/blog</a:t>
+            </a:r>
+            <a:endParaRPr lang="en-US" b="1" dirty="0" smtClean="0"/>
+          </a:p>
+        </p:txBody>
+      </p:sp>
+      <p:pic>
+        <p:nvPicPr>
+          <p:cNvPr id="5" name="Picture 2" descr="C:\Users\javier\Pictures\mvp_logo.jpg"/>
+          <p:cNvPicPr>
+            <a:picLocks noChangeAspect="1" noChangeArrowheads="1"/>
+          </p:cNvPicPr>
+          <p:nvPr/>
+        </p:nvPicPr>
+        <p:blipFill>
+          <a:blip r:embed="rId3" cstate="print"/>
+          <a:srcRect/>
+          <a:stretch>
+            <a:fillRect/>
+          </a:stretch>
+        </p:blipFill>
+        <p:spPr bwMode="auto">
+          <a:xfrm>
+            <a:off x="6121400" y="2540000"/>
+            <a:ext cx="2133600" cy="863600"/>
+          </a:xfrm>
+          <a:prstGeom prst="rect">
+            <a:avLst/>
+          </a:prstGeom>
+          <a:noFill/>
+          <a:ln w="9525">
+            <a:noFill/>
+            <a:miter lim="800000"/>
+            <a:headEnd/>
+            <a:tailEnd/>
+          </a:ln>
+        </p:spPr>
+      </p:pic>
+      <p:pic>
+        <p:nvPicPr>
+          <p:cNvPr id="6" name="Picture 3" descr="C:\Users\javier\Pictures\aspinsiders_logo.gif"/>
+          <p:cNvPicPr>
+            <a:picLocks noChangeAspect="1" noChangeArrowheads="1"/>
+          </p:cNvPicPr>
+          <p:nvPr/>
+        </p:nvPicPr>
+        <p:blipFill>
+          <a:blip r:embed="rId4" cstate="print"/>
+          <a:srcRect/>
+          <a:stretch>
+            <a:fillRect/>
+          </a:stretch>
+        </p:blipFill>
+        <p:spPr bwMode="auto">
+          <a:xfrm>
+            <a:off x="6350000" y="1447800"/>
+            <a:ext cx="1905000" cy="685800"/>
+          </a:xfrm>
+          <a:prstGeom prst="rect">
+            <a:avLst/>
+          </a:prstGeom>
+          <a:noFill/>
+          <a:ln w="9525">
+            <a:noFill/>
+            <a:miter lim="800000"/>
+            <a:headEnd/>
+            <a:tailEnd/>
+          </a:ln>
+        </p:spPr>
+      </p:pic>
+      <p:sp>
+        <p:nvSpPr>
+          <p:cNvPr id="7" name="TextBox 6"/>
+          <p:cNvSpPr txBox="1"/>
+          <p:nvPr/>
+        </p:nvSpPr>
+        <p:spPr>
+          <a:xfrm>
+            <a:off x="683211" y="5181600"/>
+            <a:ext cx="7800533" cy="523220"/>
+          </a:xfrm>
+          <a:prstGeom prst="rect">
+            <a:avLst/>
+          </a:prstGeom>
+          <a:noFill/>
+        </p:spPr>
+        <p:txBody>
+          <a:bodyPr wrap="none" rtlCol="0">
+            <a:spAutoFit/>
+          </a:bodyPr>
+          <a:lstStyle/>
+          <a:p>
+            <a:r>
+              <a:rPr lang="en-US" sz="3200" dirty="0" smtClean="0">
+                <a:latin typeface="+mn-lt"/>
+              </a:rPr>
+              <a:t>https:</a:t>
+            </a:r>
+            <a:r>
+              <a:rPr lang="en-US" sz="3200" dirty="0">
+                <a:latin typeface="+mn-lt"/>
+              </a:rPr>
+              <a:t>//</a:t>
+            </a:r>
+            <a:r>
+              <a:rPr lang="en-US" sz="3200" dirty="0" err="1">
+                <a:latin typeface="+mn-lt"/>
+              </a:rPr>
+              <a:t>github.com</a:t>
+            </a:r>
+            <a:r>
+              <a:rPr lang="en-US" sz="3200" dirty="0">
+                <a:latin typeface="+mn-lt"/>
+              </a:rPr>
+              <a:t>/lozanotek</a:t>
+            </a:r>
+            <a:r>
+              <a:rPr lang="en-US" sz="3200" dirty="0" smtClean="0">
+                <a:latin typeface="+mn-lt"/>
+              </a:rPr>
+              <a:t>/</a:t>
+            </a:r>
+            <a:r>
+              <a:rPr lang="en-US" sz="3200" dirty="0" err="1" smtClean="0">
+                <a:latin typeface="+mn-lt"/>
+              </a:rPr>
+              <a:t>AdvancedMvc</a:t>
+            </a:r>
+            <a:endParaRPr lang="en-US" sz="3200" dirty="0">
+              <a:latin typeface="+mn-lt"/>
+            </a:endParaRPr>
+          </a:p>
+        </p:txBody>
+      </p:sp>
+      <p:pic>
+        <p:nvPicPr>
+          <p:cNvPr id="8" name="Picture 7"/>
+          <p:cNvPicPr>
+            <a:picLocks noChangeAspect="1"/>
+          </p:cNvPicPr>
+          <p:nvPr/>
+        </p:nvPicPr>
+        <p:blipFill>
+          <a:blip r:embed="rId5"/>
+          <a:stretch>
+            <a:fillRect/>
+          </a:stretch>
+        </p:blipFill>
+        <p:spPr>
+          <a:xfrm>
+            <a:off x="5715000" y="3657600"/>
+            <a:ext cx="2540000" cy="914400"/>
+          </a:xfrm>
+          <a:prstGeom prst="rect">
+            <a:avLst/>
+          </a:prstGeom>
+        </p:spPr>
+      </p:pic>
+    </p:spTree>
+    <p:extLst>
+      <p:ext uri="{BB962C8B-B14F-4D97-AF65-F5344CB8AC3E}">
+        <p14:creationId xmlns:p14="http://schemas.microsoft.com/office/powerpoint/2010/main" val="3293234432"/>
+      </p:ext>
+    </p:extLst>
+  </p:cSld>
+  <p:clrMapOvr>
+    <a:masterClrMapping/>
+  </p:clrMapOvr>
+  <mc:AlternateContent xmlns:mc="http://schemas.openxmlformats.org/markup-compatibility/2006">
+    <mc:Choice xmlns:p14="http://schemas.microsoft.com/office/powerpoint/2010/main" Requires="p14">
+      <p:transition spd="med" p14:dur="700">
+        <p:fade/>
+      </p:transition>
+    </mc:Choice>
+    <mc:Fallback>
+      <p:transition xmlns:p14="http://schemas.microsoft.com/office/powerpoint/2010/main" spd="med">
+        <p:fade/>
+      </p:transition>
+    </mc:Fallback>
+  </mc:AlternateContent>
+  <p:timing>
+    <p:tnLst>
+      <p:par>
+        <p:cTn xmlns:p14="http://schemas.microsoft.com/office/powerpoint/2010/main" id="1" dur="indefinite" restart="never" nodeType="tmRoot"/>
+      </p:par>
+    </p:tnLst>
+  </p:timing>
+</p:sld>
+</file>
+
+<file path=ppt/slides/slide6.xml><?xml version="1.0" encoding="utf-8"?>
+<p:sld xmlns:a="http://schemas.openxmlformats.org/drawingml/2006/main" xmlns:r="http://schemas.openxmlformats.org/officeDocument/2006/relationships" xmlns:p="http://schemas.openxmlformats.org/presentationml/2006/main">
+  <p:cSld>
+    <p:spTree>
+      <p:nvGrpSpPr>
+        <p:cNvPr id="1" name=""/>
+        <p:cNvGrpSpPr/>
+        <p:nvPr/>
+      </p:nvGrpSpPr>
+      <p:grpSpPr>
+        <a:xfrm>
+          <a:off x="0" y="0"/>
+          <a:ext cx="0" cy="0"/>
+          <a:chOff x="0" y="0"/>
+          <a:chExt cx="0" cy="0"/>
+        </a:xfrm>
+      </p:grpSpPr>
+      <p:sp>
+        <p:nvSpPr>
+          <p:cNvPr id="2" name="Title 1"/>
+          <p:cNvSpPr>
+            <a:spLocks noGrp="1"/>
+          </p:cNvSpPr>
+          <p:nvPr>
+            <p:ph type="title"/>
+          </p:nvPr>
+        </p:nvSpPr>
+        <p:spPr>
+          <a:xfrm>
+            <a:off x="381000" y="228600"/>
+            <a:ext cx="8382000" cy="769441"/>
+          </a:xfrm>
+        </p:spPr>
+        <p:txBody>
+          <a:bodyPr/>
+          <a:lstStyle/>
+          <a:p>
+            <a:r>
+              <a:rPr lang="en-US" b="1" dirty="0" smtClean="0"/>
+              <a:t>Demo</a:t>
+            </a:r>
+            <a:endParaRPr lang="en-US" b="1" dirty="0"/>
+          </a:p>
+        </p:txBody>
+      </p:sp>
+      <p:sp>
+        <p:nvSpPr>
+          <p:cNvPr id="3" name="Content Placeholder 2"/>
+          <p:cNvSpPr>
+            <a:spLocks noGrp="1"/>
+          </p:cNvSpPr>
+          <p:nvPr>
+            <p:ph idx="1"/>
+          </p:nvPr>
+        </p:nvSpPr>
+        <p:spPr>
+          <a:xfrm>
+            <a:off x="366713" y="3044280"/>
+            <a:ext cx="8410575" cy="769441"/>
+          </a:xfrm>
+        </p:spPr>
+        <p:txBody>
+          <a:bodyPr/>
+          <a:lstStyle/>
+          <a:p>
+            <a:pPr algn="ctr">
+              <a:buNone/>
+            </a:pPr>
+            <a:r>
+              <a:rPr lang="en-US" sz="4800" b="1" dirty="0" smtClean="0"/>
+              <a:t>Enough slides, let’s code.</a:t>
+            </a:r>
+            <a:endParaRPr lang="en-US" sz="2800" b="1" dirty="0" smtClean="0"/>
+          </a:p>
+        </p:txBody>
+      </p:sp>
+    </p:spTree>
+    <p:extLst>
+      <p:ext uri="{BB962C8B-B14F-4D97-AF65-F5344CB8AC3E}">
+        <p14:creationId xmlns:p14="http://schemas.microsoft.com/office/powerpoint/2010/main" val="2921785292"/>
+      </p:ext>
+    </p:extLst>
+  </p:cSld>
+  <p:clrMapOvr>
+    <a:masterClrMapping/>
+  </p:clrMapOvr>
+  <p:transition xmlns:p14="http://schemas.microsoft.com/office/powerpoint/2010/main">
+    <p:fade/>
+  </p:transition>
+  <p:timing>
+    <p:tnLst>
+      <p:par>
+        <p:cTn xmlns:p14="http://schemas.microsoft.com/office/powerpoint/2010/main" id="1" dur="indefinite" restart="never" nodeType="tmRoot"/>
+      </p:par>
+    </p:tnLst>
+  </p:timing>
+</p:sld>
+</file>
+
+<file path=ppt/slides/slide7.xml><?xml version="1.0" encoding="utf-8"?>
+<p:sld xmlns:a="http://schemas.openxmlformats.org/drawingml/2006/main" xmlns:r="http://schemas.openxmlformats.org/officeDocument/2006/relationships" xmlns:p="http://schemas.openxmlformats.org/presentationml/2006/main">
+  <p:cSld>
+    <p:spTree>
+      <p:nvGrpSpPr>
+        <p:cNvPr id="1" name=""/>
+        <p:cNvGrpSpPr/>
+        <p:nvPr/>
+      </p:nvGrpSpPr>
+      <p:grpSpPr>
+        <a:xfrm>
+          <a:off x="0" y="0"/>
+          <a:ext cx="0" cy="0"/>
+          <a:chOff x="0" y="0"/>
+          <a:chExt cx="0" cy="0"/>
+        </a:xfrm>
+      </p:grpSpPr>
+      <p:sp>
+        <p:nvSpPr>
+          <p:cNvPr id="2" name="Title 1"/>
+          <p:cNvSpPr>
+            <a:spLocks noGrp="1"/>
+          </p:cNvSpPr>
+          <p:nvPr>
+            <p:ph type="title"/>
+          </p:nvPr>
+        </p:nvSpPr>
+        <p:spPr/>
+        <p:txBody>
+          <a:bodyPr/>
+          <a:lstStyle/>
+          <a:p>
+            <a:r>
+              <a:rPr lang="en-US" b="1" dirty="0" smtClean="0"/>
               <a:t>Thanks!</a:t>
             </a:r>
             <a:endParaRPr lang="en-US" b="1" dirty="0"/>
@@ -7466,47 +9647,18 @@
           </a:p>
         </p:txBody>
       </p:sp>
-      <p:sp>
-        <p:nvSpPr>
-          <p:cNvPr id="4" name="Slide Number Placeholder 3"/>
-          <p:cNvSpPr>
-            <a:spLocks noGrp="1"/>
-          </p:cNvSpPr>
-          <p:nvPr>
-            <p:ph type="sldNum" sz="quarter" idx="10"/>
-          </p:nvPr>
-        </p:nvSpPr>
-        <p:spPr/>
-        <p:txBody>
-          <a:bodyPr/>
-          <a:lstStyle/>
-          <a:p>
-            <a:pPr>
-              <a:defRPr/>
-            </a:pPr>
-            <a:fld id="{B63753EC-566D-40B0-951D-58F31B9256E5}" type="slidenum">
-              <a:rPr lang="en-US" smtClean="0"/>
-              <a:pPr>
-                <a:defRPr/>
-              </a:pPr>
-              <a:t>4</a:t>
-            </a:fld>
-            <a:endParaRPr lang="en-US"/>
-          </a:p>
-        </p:txBody>
-      </p:sp>
     </p:spTree>
   </p:cSld>
   <p:clrMapOvr>
     <a:masterClrMapping/>
   </p:clrMapOvr>
-  <p:transition>
+  <p:transition xmlns:p14="http://schemas.microsoft.com/office/powerpoint/2010/main">
     <p:fade/>
   </p:transition>
   <p:timing>
     <p:tnLst>
       <p:par>
-        <p:cTn id="1" dur="indefinite" restart="never" nodeType="tmRoot"/>
+        <p:cTn xmlns:p14="http://schemas.microsoft.com/office/powerpoint/2010/main" id="1" dur="indefinite" restart="never" nodeType="tmRoot"/>
       </p:par>
     </p:tnLst>
   </p:timing>

</xml_diff>

<commit_message>
Added controller factory for the inferred demo.
</commit_message>
<xml_diff>
--- a/slides/AdvancedMvc.pptx
+++ b/slides/AdvancedMvc.pptx
@@ -23,7 +23,7 @@
   <p:sldSz cx="9144000" cy="6858000" type="screen4x3"/>
   <p:notesSz cx="9601200" cy="7315200"/>
   <p:custDataLst>
-    <p:tags r:id="rId13"/>
+    <p:tags r:id="rId12"/>
   </p:custDataLst>
   <p:defaultTextStyle>
     <a:defPPr>
@@ -248,7 +248,7 @@
               <a:pPr>
                 <a:defRPr/>
               </a:pPr>
-              <a:t>7/26/12 21:38</a:t>
+              <a:t>8/3/2012 8:48 AM</a:t>
             </a:fld>
             <a:endParaRPr lang="en-US"/>
           </a:p>
@@ -463,7 +463,7 @@
               <a:pPr>
                 <a:defRPr/>
               </a:pPr>
-              <a:t>7/26/12 21:38</a:t>
+              <a:t>8/3/2012 8:48 AM</a:t>
             </a:fld>
             <a:endParaRPr lang="en-US"/>
           </a:p>
@@ -868,7 +868,7 @@
             <a:fld id="{645EDAD1-88E4-4536-AD95-0BFD82EC77E6}" type="datetime8">
               <a:rPr lang="en-US" smtClean="0"/>
               <a:pPr/>
-              <a:t>7/28/12 20:04</a:t>
+              <a:t>8/3/2012 8:48 AM</a:t>
             </a:fld>
             <a:endParaRPr lang="en-US" smtClean="0"/>
           </a:p>
@@ -1038,7 +1038,7 @@
   <p:clrMapOvr>
     <a:masterClrMapping/>
   </p:clrMapOvr>
-  <p:transition xmlns:p14="http://schemas.microsoft.com/office/powerpoint/2010/main">
+  <p:transition>
     <p:fade/>
   </p:transition>
 </p:sldLayout>
@@ -1151,7 +1151,7 @@
   <p:clrMapOvr>
     <a:masterClrMapping/>
   </p:clrMapOvr>
-  <p:transition xmlns:p14="http://schemas.microsoft.com/office/powerpoint/2010/main">
+  <p:transition>
     <p:fade/>
   </p:transition>
 </p:sldLayout>
@@ -1264,7 +1264,7 @@
   <p:clrMapOvr>
     <a:masterClrMapping/>
   </p:clrMapOvr>
-  <p:transition xmlns:p14="http://schemas.microsoft.com/office/powerpoint/2010/main">
+  <p:transition>
     <p:fade/>
   </p:transition>
 </p:sldLayout>
@@ -3290,7 +3290,7 @@
   <p:clrMapOvr>
     <a:masterClrMapping/>
   </p:clrMapOvr>
-  <p:transition xmlns:p14="http://schemas.microsoft.com/office/powerpoint/2010/main">
+  <p:transition>
     <p:fade/>
   </p:transition>
 </p:sldLayout>
@@ -4082,7 +4082,7 @@
   <p:clrMapOvr>
     <a:masterClrMapping/>
   </p:clrMapOvr>
-  <p:transition xmlns:p14="http://schemas.microsoft.com/office/powerpoint/2010/main">
+  <p:transition>
     <p:fade/>
   </p:transition>
 </p:sldLayout>
@@ -4308,7 +4308,7 @@
   <p:clrMapOvr>
     <a:masterClrMapping/>
   </p:clrMapOvr>
-  <p:transition xmlns:p14="http://schemas.microsoft.com/office/powerpoint/2010/main">
+  <p:transition>
     <p:fade/>
   </p:transition>
 </p:sldLayout>
@@ -4668,7 +4668,7 @@
   <p:clrMapOvr>
     <a:masterClrMapping/>
   </p:clrMapOvr>
-  <p:transition xmlns:p14="http://schemas.microsoft.com/office/powerpoint/2010/main">
+  <p:transition>
     <p:fade/>
   </p:transition>
 </p:sldLayout>
@@ -4724,7 +4724,7 @@
   <p:clrMapOvr>
     <a:masterClrMapping/>
   </p:clrMapOvr>
-  <p:transition xmlns:p14="http://schemas.microsoft.com/office/powerpoint/2010/main">
+  <p:transition>
     <p:fade/>
   </p:transition>
 </p:sldLayout>
@@ -4752,7 +4752,7 @@
   <p:clrMapOvr>
     <a:masterClrMapping/>
   </p:clrMapOvr>
-  <p:transition xmlns:p14="http://schemas.microsoft.com/office/powerpoint/2010/main">
+  <p:transition>
     <p:fade/>
   </p:transition>
 </p:sldLayout>
@@ -4962,7 +4962,7 @@
   <p:clrMapOvr>
     <a:masterClrMapping/>
   </p:clrMapOvr>
-  <p:transition xmlns:p14="http://schemas.microsoft.com/office/powerpoint/2010/main">
+  <p:transition>
     <p:fade/>
   </p:transition>
 </p:sldLayout>
@@ -5152,7 +5152,7 @@
   <p:clrMapOvr>
     <a:masterClrMapping/>
   </p:clrMapOvr>
-  <p:transition xmlns:p14="http://schemas.microsoft.com/office/powerpoint/2010/main">
+  <p:transition>
     <p:fade/>
   </p:transition>
 </p:sldLayout>
@@ -5319,13 +5319,13 @@
     <p:sldLayoutId id="2147483779" r:id="rId10"/>
     <p:sldLayoutId id="2147483780" r:id="rId11"/>
   </p:sldLayoutIdLst>
-  <p:transition xmlns:p14="http://schemas.microsoft.com/office/powerpoint/2010/main">
+  <p:transition>
     <p:fade/>
   </p:transition>
   <p:timing>
     <p:tnLst>
       <p:par>
-        <p:cTn xmlns:p14="http://schemas.microsoft.com/office/powerpoint/2010/main" id="1" dur="indefinite" restart="never" nodeType="tmRoot"/>
+        <p:cTn id="1" dur="indefinite" restart="never" nodeType="tmRoot"/>
       </p:par>
     </p:tnLst>
   </p:timing>
@@ -6741,13 +6741,13 @@
   <p:clrMapOvr>
     <a:masterClrMapping/>
   </p:clrMapOvr>
-  <p:transition xmlns:p14="http://schemas.microsoft.com/office/powerpoint/2010/main">
+  <p:transition>
     <p:fade/>
   </p:transition>
   <p:timing>
     <p:tnLst>
       <p:par>
-        <p:cTn xmlns:p14="http://schemas.microsoft.com/office/powerpoint/2010/main" id="1" dur="indefinite" restart="never" nodeType="tmRoot"/>
+        <p:cTn id="1" dur="indefinite" restart="never" nodeType="tmRoot"/>
       </p:par>
     </p:tnLst>
   </p:timing>
@@ -6889,14 +6889,14 @@
               </a:ln>
               <a:effectLst/>
               <a:extLst>
-                <a:ext uri="{909E8E84-426E-40dd-AFC4-6F175D3DCCD1}">
+                <a:ext uri="{909E8E84-426E-40DD-AFC4-6F175D3DCCD1}">
                   <a14:hiddenFill xmlns:a14="http://schemas.microsoft.com/office/drawing/2010/main">
                     <a:solidFill>
                       <a:schemeClr val="accent1"/>
                     </a:solidFill>
                   </a14:hiddenFill>
                 </a:ext>
-                <a:ext uri="{91240B29-F687-4f45-9708-019B960494DF}">
+                <a:ext uri="{91240B29-F687-4F45-9708-019B960494DF}">
                   <a14:hiddenLine xmlns:a14="http://schemas.microsoft.com/office/drawing/2010/main" w="9525">
                     <a:solidFill>
                       <a:schemeClr val="tx1"/>
@@ -6906,7 +6906,7 @@
                     <a:tailEnd/>
                   </a14:hiddenLine>
                 </a:ext>
-                <a:ext uri="{AF507438-7753-43e0-B8FC-AC1667EBCBE1}">
+                <a:ext uri="{AF507438-7753-43E0-B8FC-AC1667EBCBE1}">
                   <a14:hiddenEffects xmlns:a14="http://schemas.microsoft.com/office/drawing/2010/main">
                     <a:effectLst>
                       <a:outerShdw dist="35921" dir="2700000" algn="ctr" rotWithShape="0">
@@ -6953,14 +6953,14 @@
               </a:ln>
               <a:effectLst/>
               <a:extLst>
-                <a:ext uri="{909E8E84-426E-40dd-AFC4-6F175D3DCCD1}">
+                <a:ext uri="{909E8E84-426E-40DD-AFC4-6F175D3DCCD1}">
                   <a14:hiddenFill xmlns:a14="http://schemas.microsoft.com/office/drawing/2010/main">
                     <a:solidFill>
                       <a:schemeClr val="accent1"/>
                     </a:solidFill>
                   </a14:hiddenFill>
                 </a:ext>
-                <a:ext uri="{91240B29-F687-4f45-9708-019B960494DF}">
+                <a:ext uri="{91240B29-F687-4F45-9708-019B960494DF}">
                   <a14:hiddenLine xmlns:a14="http://schemas.microsoft.com/office/drawing/2010/main" w="9525">
                     <a:solidFill>
                       <a:schemeClr val="tx1"/>
@@ -6970,7 +6970,7 @@
                     <a:tailEnd/>
                   </a14:hiddenLine>
                 </a:ext>
-                <a:ext uri="{AF507438-7753-43e0-B8FC-AC1667EBCBE1}">
+                <a:ext uri="{AF507438-7753-43E0-B8FC-AC1667EBCBE1}">
                   <a14:hiddenEffects xmlns:a14="http://schemas.microsoft.com/office/drawing/2010/main">
                     <a:effectLst>
                       <a:outerShdw dist="35921" dir="2700000" algn="ctr" rotWithShape="0">
@@ -7017,14 +7017,14 @@
               </a:ln>
               <a:effectLst/>
               <a:extLst>
-                <a:ext uri="{909E8E84-426E-40dd-AFC4-6F175D3DCCD1}">
+                <a:ext uri="{909E8E84-426E-40DD-AFC4-6F175D3DCCD1}">
                   <a14:hiddenFill xmlns:a14="http://schemas.microsoft.com/office/drawing/2010/main">
                     <a:solidFill>
                       <a:schemeClr val="accent1"/>
                     </a:solidFill>
                   </a14:hiddenFill>
                 </a:ext>
-                <a:ext uri="{91240B29-F687-4f45-9708-019B960494DF}">
+                <a:ext uri="{91240B29-F687-4F45-9708-019B960494DF}">
                   <a14:hiddenLine xmlns:a14="http://schemas.microsoft.com/office/drawing/2010/main" w="9525">
                     <a:solidFill>
                       <a:schemeClr val="tx1"/>
@@ -7034,7 +7034,7 @@
                     <a:tailEnd/>
                   </a14:hiddenLine>
                 </a:ext>
-                <a:ext uri="{AF507438-7753-43e0-B8FC-AC1667EBCBE1}">
+                <a:ext uri="{AF507438-7753-43E0-B8FC-AC1667EBCBE1}">
                   <a14:hiddenEffects xmlns:a14="http://schemas.microsoft.com/office/drawing/2010/main">
                     <a:effectLst>
                       <a:outerShdw dist="35921" dir="2700000" algn="ctr" rotWithShape="0">
@@ -7081,14 +7081,14 @@
               </a:ln>
               <a:effectLst/>
               <a:extLst>
-                <a:ext uri="{909E8E84-426E-40dd-AFC4-6F175D3DCCD1}">
+                <a:ext uri="{909E8E84-426E-40DD-AFC4-6F175D3DCCD1}">
                   <a14:hiddenFill xmlns:a14="http://schemas.microsoft.com/office/drawing/2010/main">
                     <a:solidFill>
                       <a:schemeClr val="accent1"/>
                     </a:solidFill>
                   </a14:hiddenFill>
                 </a:ext>
-                <a:ext uri="{91240B29-F687-4f45-9708-019B960494DF}">
+                <a:ext uri="{91240B29-F687-4F45-9708-019B960494DF}">
                   <a14:hiddenLine xmlns:a14="http://schemas.microsoft.com/office/drawing/2010/main" w="9525">
                     <a:solidFill>
                       <a:schemeClr val="tx1"/>
@@ -7098,7 +7098,7 @@
                     <a:tailEnd/>
                   </a14:hiddenLine>
                 </a:ext>
-                <a:ext uri="{AF507438-7753-43e0-B8FC-AC1667EBCBE1}">
+                <a:ext uri="{AF507438-7753-43E0-B8FC-AC1667EBCBE1}">
                   <a14:hiddenEffects xmlns:a14="http://schemas.microsoft.com/office/drawing/2010/main">
                     <a:effectLst>
                       <a:outerShdw dist="35921" dir="2700000" algn="ctr" rotWithShape="0">
@@ -7141,7 +7141,7 @@
               </a:prstGeom>
               <a:noFill/>
               <a:extLst>
-                <a:ext uri="{909E8E84-426E-40dd-AFC4-6F175D3DCCD1}">
+                <a:ext uri="{909E8E84-426E-40DD-AFC4-6F175D3DCCD1}">
                   <a14:hiddenFill xmlns:a14="http://schemas.microsoft.com/office/drawing/2010/main">
                     <a:solidFill>
                       <a:srgbClr val="FFFFFF"/>
@@ -7182,7 +7182,7 @@
               </a:prstGeom>
               <a:noFill/>
               <a:extLst>
-                <a:ext uri="{909E8E84-426E-40dd-AFC4-6F175D3DCCD1}">
+                <a:ext uri="{909E8E84-426E-40DD-AFC4-6F175D3DCCD1}">
                   <a14:hiddenFill xmlns:a14="http://schemas.microsoft.com/office/drawing/2010/main">
                     <a:solidFill>
                       <a:srgbClr val="FFFFFF"/>
@@ -7382,7 +7382,7 @@
               </a:prstGeom>
               <a:noFill/>
               <a:extLst>
-                <a:ext uri="{909E8E84-426E-40dd-AFC4-6F175D3DCCD1}">
+                <a:ext uri="{909E8E84-426E-40DD-AFC4-6F175D3DCCD1}">
                   <a14:hiddenFill xmlns:a14="http://schemas.microsoft.com/office/drawing/2010/main">
                     <a:solidFill>
                       <a:srgbClr val="FFFFFF"/>
@@ -7423,7 +7423,7 @@
               </a:prstGeom>
               <a:noFill/>
               <a:extLst>
-                <a:ext uri="{909E8E84-426E-40dd-AFC4-6F175D3DCCD1}">
+                <a:ext uri="{909E8E84-426E-40DD-AFC4-6F175D3DCCD1}">
                   <a14:hiddenFill xmlns:a14="http://schemas.microsoft.com/office/drawing/2010/main">
                     <a:solidFill>
                       <a:srgbClr val="FFFFFF"/>
@@ -7464,7 +7464,7 @@
               </a:prstGeom>
               <a:noFill/>
               <a:extLst>
-                <a:ext uri="{909E8E84-426E-40dd-AFC4-6F175D3DCCD1}">
+                <a:ext uri="{909E8E84-426E-40DD-AFC4-6F175D3DCCD1}">
                   <a14:hiddenFill xmlns:a14="http://schemas.microsoft.com/office/drawing/2010/main">
                     <a:solidFill>
                       <a:srgbClr val="FFFFFF"/>
@@ -7505,7 +7505,7 @@
               </a:prstGeom>
               <a:noFill/>
               <a:extLst>
-                <a:ext uri="{909E8E84-426E-40dd-AFC4-6F175D3DCCD1}">
+                <a:ext uri="{909E8E84-426E-40DD-AFC4-6F175D3DCCD1}">
                   <a14:hiddenFill xmlns:a14="http://schemas.microsoft.com/office/drawing/2010/main">
                     <a:solidFill>
                       <a:srgbClr val="FFFFFF"/>
@@ -7546,7 +7546,7 @@
               </a:prstGeom>
               <a:noFill/>
               <a:extLst>
-                <a:ext uri="{909E8E84-426E-40dd-AFC4-6F175D3DCCD1}">
+                <a:ext uri="{909E8E84-426E-40DD-AFC4-6F175D3DCCD1}">
                   <a14:hiddenFill xmlns:a14="http://schemas.microsoft.com/office/drawing/2010/main">
                     <a:solidFill>
                       <a:srgbClr val="FFFFFF"/>
@@ -7746,7 +7746,7 @@
               </a:prstGeom>
               <a:noFill/>
               <a:extLst>
-                <a:ext uri="{909E8E84-426E-40dd-AFC4-6F175D3DCCD1}">
+                <a:ext uri="{909E8E84-426E-40DD-AFC4-6F175D3DCCD1}">
                   <a14:hiddenFill xmlns:a14="http://schemas.microsoft.com/office/drawing/2010/main">
                     <a:solidFill>
                       <a:srgbClr val="FFFFFF"/>
@@ -7787,7 +7787,7 @@
               </a:prstGeom>
               <a:noFill/>
               <a:extLst>
-                <a:ext uri="{909E8E84-426E-40dd-AFC4-6F175D3DCCD1}">
+                <a:ext uri="{909E8E84-426E-40DD-AFC4-6F175D3DCCD1}">
                   <a14:hiddenFill xmlns:a14="http://schemas.microsoft.com/office/drawing/2010/main">
                     <a:solidFill>
                       <a:srgbClr val="FFFFFF"/>
@@ -7828,7 +7828,7 @@
               </a:prstGeom>
               <a:noFill/>
               <a:extLst>
-                <a:ext uri="{909E8E84-426E-40dd-AFC4-6F175D3DCCD1}">
+                <a:ext uri="{909E8E84-426E-40DD-AFC4-6F175D3DCCD1}">
                   <a14:hiddenFill xmlns:a14="http://schemas.microsoft.com/office/drawing/2010/main">
                     <a:solidFill>
                       <a:srgbClr val="FFFFFF"/>
@@ -7869,7 +7869,7 @@
               </a:prstGeom>
               <a:noFill/>
               <a:extLst>
-                <a:ext uri="{909E8E84-426E-40dd-AFC4-6F175D3DCCD1}">
+                <a:ext uri="{909E8E84-426E-40DD-AFC4-6F175D3DCCD1}">
                   <a14:hiddenFill xmlns:a14="http://schemas.microsoft.com/office/drawing/2010/main">
                     <a:solidFill>
                       <a:srgbClr val="FFFFFF"/>
@@ -7910,7 +7910,7 @@
               </a:prstGeom>
               <a:noFill/>
               <a:extLst>
-                <a:ext uri="{909E8E84-426E-40dd-AFC4-6F175D3DCCD1}">
+                <a:ext uri="{909E8E84-426E-40DD-AFC4-6F175D3DCCD1}">
                   <a14:hiddenFill xmlns:a14="http://schemas.microsoft.com/office/drawing/2010/main">
                     <a:solidFill>
                       <a:srgbClr val="FFFFFF"/>
@@ -7951,7 +7951,7 @@
               </a:prstGeom>
               <a:noFill/>
               <a:extLst>
-                <a:ext uri="{909E8E84-426E-40dd-AFC4-6F175D3DCCD1}">
+                <a:ext uri="{909E8E84-426E-40DD-AFC4-6F175D3DCCD1}">
                   <a14:hiddenFill xmlns:a14="http://schemas.microsoft.com/office/drawing/2010/main">
                     <a:solidFill>
                       <a:srgbClr val="FFFFFF"/>
@@ -7992,7 +7992,7 @@
               </a:prstGeom>
               <a:noFill/>
               <a:extLst>
-                <a:ext uri="{909E8E84-426E-40dd-AFC4-6F175D3DCCD1}">
+                <a:ext uri="{909E8E84-426E-40DD-AFC4-6F175D3DCCD1}">
                   <a14:hiddenFill xmlns:a14="http://schemas.microsoft.com/office/drawing/2010/main">
                     <a:solidFill>
                       <a:srgbClr val="FFFFFF"/>
@@ -8033,7 +8033,7 @@
               </a:prstGeom>
               <a:noFill/>
               <a:extLst>
-                <a:ext uri="{909E8E84-426E-40dd-AFC4-6F175D3DCCD1}">
+                <a:ext uri="{909E8E84-426E-40DD-AFC4-6F175D3DCCD1}">
                   <a14:hiddenFill xmlns:a14="http://schemas.microsoft.com/office/drawing/2010/main">
                     <a:solidFill>
                       <a:srgbClr val="FFFFFF"/>
@@ -8074,7 +8074,7 @@
               </a:prstGeom>
               <a:noFill/>
               <a:extLst>
-                <a:ext uri="{909E8E84-426E-40dd-AFC4-6F175D3DCCD1}">
+                <a:ext uri="{909E8E84-426E-40DD-AFC4-6F175D3DCCD1}">
                   <a14:hiddenFill xmlns:a14="http://schemas.microsoft.com/office/drawing/2010/main">
                     <a:solidFill>
                       <a:srgbClr val="FFFFFF"/>
@@ -8115,7 +8115,7 @@
               </a:prstGeom>
               <a:noFill/>
               <a:extLst>
-                <a:ext uri="{909E8E84-426E-40dd-AFC4-6F175D3DCCD1}">
+                <a:ext uri="{909E8E84-426E-40DD-AFC4-6F175D3DCCD1}">
                   <a14:hiddenFill xmlns:a14="http://schemas.microsoft.com/office/drawing/2010/main">
                     <a:solidFill>
                       <a:srgbClr val="FFFFFF"/>
@@ -8156,7 +8156,7 @@
               </a:prstGeom>
               <a:noFill/>
               <a:extLst>
-                <a:ext uri="{909E8E84-426E-40dd-AFC4-6F175D3DCCD1}">
+                <a:ext uri="{909E8E84-426E-40DD-AFC4-6F175D3DCCD1}">
                   <a14:hiddenFill xmlns:a14="http://schemas.microsoft.com/office/drawing/2010/main">
                     <a:solidFill>
                       <a:srgbClr val="FFFFFF"/>
@@ -8197,7 +8197,7 @@
               </a:prstGeom>
               <a:noFill/>
               <a:extLst>
-                <a:ext uri="{909E8E84-426E-40dd-AFC4-6F175D3DCCD1}">
+                <a:ext uri="{909E8E84-426E-40DD-AFC4-6F175D3DCCD1}">
                   <a14:hiddenFill xmlns:a14="http://schemas.microsoft.com/office/drawing/2010/main">
                     <a:solidFill>
                       <a:srgbClr val="FFFFFF"/>
@@ -8238,7 +8238,7 @@
               </a:prstGeom>
               <a:noFill/>
               <a:extLst>
-                <a:ext uri="{909E8E84-426E-40dd-AFC4-6F175D3DCCD1}">
+                <a:ext uri="{909E8E84-426E-40DD-AFC4-6F175D3DCCD1}">
                   <a14:hiddenFill xmlns:a14="http://schemas.microsoft.com/office/drawing/2010/main">
                     <a:solidFill>
                       <a:srgbClr val="FFFFFF"/>
@@ -8279,7 +8279,7 @@
               </a:prstGeom>
               <a:noFill/>
               <a:extLst>
-                <a:ext uri="{909E8E84-426E-40dd-AFC4-6F175D3DCCD1}">
+                <a:ext uri="{909E8E84-426E-40DD-AFC4-6F175D3DCCD1}">
                   <a14:hiddenFill xmlns:a14="http://schemas.microsoft.com/office/drawing/2010/main">
                     <a:solidFill>
                       <a:srgbClr val="FFFFFF"/>
@@ -8320,7 +8320,7 @@
               </a:prstGeom>
               <a:noFill/>
               <a:extLst>
-                <a:ext uri="{909E8E84-426E-40dd-AFC4-6F175D3DCCD1}">
+                <a:ext uri="{909E8E84-426E-40DD-AFC4-6F175D3DCCD1}">
                   <a14:hiddenFill xmlns:a14="http://schemas.microsoft.com/office/drawing/2010/main">
                     <a:solidFill>
                       <a:srgbClr val="FFFFFF"/>
@@ -8361,7 +8361,7 @@
               </a:prstGeom>
               <a:noFill/>
               <a:extLst>
-                <a:ext uri="{909E8E84-426E-40dd-AFC4-6F175D3DCCD1}">
+                <a:ext uri="{909E8E84-426E-40DD-AFC4-6F175D3DCCD1}">
                   <a14:hiddenFill xmlns:a14="http://schemas.microsoft.com/office/drawing/2010/main">
                     <a:solidFill>
                       <a:srgbClr val="FFFFFF"/>
@@ -8402,7 +8402,7 @@
               </a:prstGeom>
               <a:noFill/>
               <a:extLst>
-                <a:ext uri="{909E8E84-426E-40dd-AFC4-6F175D3DCCD1}">
+                <a:ext uri="{909E8E84-426E-40DD-AFC4-6F175D3DCCD1}">
                   <a14:hiddenFill xmlns:a14="http://schemas.microsoft.com/office/drawing/2010/main">
                     <a:solidFill>
                       <a:srgbClr val="FFFFFF"/>
@@ -8443,7 +8443,7 @@
               </a:prstGeom>
               <a:noFill/>
               <a:extLst>
-                <a:ext uri="{909E8E84-426E-40dd-AFC4-6F175D3DCCD1}">
+                <a:ext uri="{909E8E84-426E-40DD-AFC4-6F175D3DCCD1}">
                   <a14:hiddenFill xmlns:a14="http://schemas.microsoft.com/office/drawing/2010/main">
                     <a:solidFill>
                       <a:srgbClr val="FFFFFF"/>
@@ -8573,7 +8573,7 @@
               </a:prstGeom>
               <a:noFill/>
               <a:extLst>
-                <a:ext uri="{909E8E84-426E-40dd-AFC4-6F175D3DCCD1}">
+                <a:ext uri="{909E8E84-426E-40DD-AFC4-6F175D3DCCD1}">
                   <a14:hiddenFill xmlns:a14="http://schemas.microsoft.com/office/drawing/2010/main">
                     <a:solidFill>
                       <a:srgbClr val="FFFFFF"/>
@@ -8614,7 +8614,7 @@
               </a:prstGeom>
               <a:noFill/>
               <a:extLst>
-                <a:ext uri="{909E8E84-426E-40dd-AFC4-6F175D3DCCD1}">
+                <a:ext uri="{909E8E84-426E-40DD-AFC4-6F175D3DCCD1}">
                   <a14:hiddenFill xmlns:a14="http://schemas.microsoft.com/office/drawing/2010/main">
                     <a:solidFill>
                       <a:srgbClr val="FFFFFF"/>
@@ -8655,7 +8655,7 @@
               </a:prstGeom>
               <a:noFill/>
               <a:extLst>
-                <a:ext uri="{909E8E84-426E-40dd-AFC4-6F175D3DCCD1}">
+                <a:ext uri="{909E8E84-426E-40DD-AFC4-6F175D3DCCD1}">
                   <a14:hiddenFill xmlns:a14="http://schemas.microsoft.com/office/drawing/2010/main">
                     <a:solidFill>
                       <a:srgbClr val="FFFFFF"/>
@@ -8696,7 +8696,7 @@
               </a:prstGeom>
               <a:noFill/>
               <a:extLst>
-                <a:ext uri="{909E8E84-426E-40dd-AFC4-6F175D3DCCD1}">
+                <a:ext uri="{909E8E84-426E-40DD-AFC4-6F175D3DCCD1}">
                   <a14:hiddenFill xmlns:a14="http://schemas.microsoft.com/office/drawing/2010/main">
                     <a:solidFill>
                       <a:srgbClr val="FFFFFF"/>
@@ -8737,7 +8737,7 @@
               </a:prstGeom>
               <a:noFill/>
               <a:extLst>
-                <a:ext uri="{909E8E84-426E-40dd-AFC4-6F175D3DCCD1}">
+                <a:ext uri="{909E8E84-426E-40DD-AFC4-6F175D3DCCD1}">
                   <a14:hiddenFill xmlns:a14="http://schemas.microsoft.com/office/drawing/2010/main">
                     <a:solidFill>
                       <a:srgbClr val="FFFFFF"/>
@@ -8778,7 +8778,7 @@
               </a:prstGeom>
               <a:noFill/>
               <a:extLst>
-                <a:ext uri="{909E8E84-426E-40dd-AFC4-6F175D3DCCD1}">
+                <a:ext uri="{909E8E84-426E-40DD-AFC4-6F175D3DCCD1}">
                   <a14:hiddenFill xmlns:a14="http://schemas.microsoft.com/office/drawing/2010/main">
                     <a:solidFill>
                       <a:srgbClr val="FFFFFF"/>
@@ -8819,7 +8819,7 @@
               </a:prstGeom>
               <a:noFill/>
               <a:extLst>
-                <a:ext uri="{909E8E84-426E-40dd-AFC4-6F175D3DCCD1}">
+                <a:ext uri="{909E8E84-426E-40DD-AFC4-6F175D3DCCD1}">
                   <a14:hiddenFill xmlns:a14="http://schemas.microsoft.com/office/drawing/2010/main">
                     <a:solidFill>
                       <a:srgbClr val="FFFFFF"/>
@@ -8860,7 +8860,7 @@
               </a:prstGeom>
               <a:noFill/>
               <a:extLst>
-                <a:ext uri="{909E8E84-426E-40dd-AFC4-6F175D3DCCD1}">
+                <a:ext uri="{909E8E84-426E-40DD-AFC4-6F175D3DCCD1}">
                   <a14:hiddenFill xmlns:a14="http://schemas.microsoft.com/office/drawing/2010/main">
                     <a:solidFill>
                       <a:srgbClr val="FFFFFF"/>
@@ -8901,7 +8901,7 @@
               </a:prstGeom>
               <a:noFill/>
               <a:extLst>
-                <a:ext uri="{909E8E84-426E-40dd-AFC4-6F175D3DCCD1}">
+                <a:ext uri="{909E8E84-426E-40DD-AFC4-6F175D3DCCD1}">
                   <a14:hiddenFill xmlns:a14="http://schemas.microsoft.com/office/drawing/2010/main">
                     <a:solidFill>
                       <a:srgbClr val="FFFFFF"/>
@@ -8942,7 +8942,7 @@
               </a:prstGeom>
               <a:noFill/>
               <a:extLst>
-                <a:ext uri="{909E8E84-426E-40dd-AFC4-6F175D3DCCD1}">
+                <a:ext uri="{909E8E84-426E-40DD-AFC4-6F175D3DCCD1}">
                   <a14:hiddenFill xmlns:a14="http://schemas.microsoft.com/office/drawing/2010/main">
                     <a:solidFill>
                       <a:srgbClr val="FFFFFF"/>
@@ -8964,13 +8964,13 @@
   <p:clrMapOvr>
     <a:masterClrMapping/>
   </p:clrMapOvr>
-  <p:transition xmlns:p14="http://schemas.microsoft.com/office/powerpoint/2010/main">
+  <p:transition>
     <p:fade/>
   </p:transition>
   <p:timing>
     <p:tnLst>
       <p:par>
-        <p:cTn xmlns:p14="http://schemas.microsoft.com/office/powerpoint/2010/main" id="1" dur="indefinite" restart="never" nodeType="tmRoot"/>
+        <p:cTn id="1" dur="indefinite" restart="never" nodeType="tmRoot"/>
       </p:par>
     </p:tnLst>
   </p:timing>
@@ -9047,11 +9047,7 @@
             </a:pPr>
             <a:r>
               <a:rPr lang="en-US" b="1" i="1" dirty="0" smtClean="0"/>
-              <a:t>For you to start thinking differently about ASP.NET MVC.  If the feature doesn’t come ‘out of the box’, it doesn’t </a:t>
-            </a:r>
-            <a:r>
-              <a:rPr lang="en-US" b="1" i="1" dirty="0" smtClean="0"/>
-              <a:t>mean it’s not possible to do.</a:t>
+              <a:t>For you to start thinking differently about ASP.NET MVC.  If the feature doesn’t come ‘out of the box’, it doesn’t mean it’s not possible to do.</a:t>
             </a:r>
           </a:p>
           <a:p>
@@ -9062,7 +9058,6 @@
               <a:rPr lang="en-US" b="1" i="1" dirty="0" smtClean="0"/>
               <a:t>Learn to ‘exploit’ the framework to do more for you…</a:t>
             </a:r>
-            <a:endParaRPr lang="en-US" b="1" i="1" dirty="0" smtClean="0"/>
           </a:p>
         </p:txBody>
       </p:sp>
@@ -9076,13 +9071,13 @@
   <p:clrMapOvr>
     <a:masterClrMapping/>
   </p:clrMapOvr>
-  <p:transition xmlns:p14="http://schemas.microsoft.com/office/powerpoint/2010/main">
+  <p:transition>
     <p:fade/>
   </p:transition>
   <p:timing>
     <p:tnLst>
       <p:par>
-        <p:cTn xmlns:p14="http://schemas.microsoft.com/office/powerpoint/2010/main" id="1" dur="indefinite" restart="never" nodeType="tmRoot"/>
+        <p:cTn id="1" dur="indefinite" restart="never" nodeType="tmRoot"/>
       </p:par>
     </p:tnLst>
   </p:timing>
@@ -9151,11 +9146,7 @@
           <a:p>
             <a:r>
               <a:rPr lang="en-US" dirty="0" smtClean="0"/>
-              <a:t>Inferred </a:t>
-            </a:r>
-            <a:r>
-              <a:rPr lang="en-US" dirty="0" smtClean="0"/>
-              <a:t>Actions</a:t>
+              <a:t>Inferred Actions</a:t>
             </a:r>
           </a:p>
           <a:p>
@@ -9189,13 +9180,13 @@
   <p:clrMapOvr>
     <a:masterClrMapping/>
   </p:clrMapOvr>
-  <p:transition xmlns:p14="http://schemas.microsoft.com/office/powerpoint/2010/main">
+  <p:transition>
     <p:fade/>
   </p:transition>
   <p:timing>
     <p:tnLst>
       <p:par>
-        <p:cTn xmlns:p14="http://schemas.microsoft.com/office/powerpoint/2010/main" id="1" dur="indefinite" restart="never" nodeType="tmRoot"/>
+        <p:cTn id="1" dur="indefinite" restart="never" nodeType="tmRoot"/>
       </p:par>
     </p:tnLst>
   </p:timing>
@@ -9310,7 +9301,7 @@
         </p:blipFill>
         <p:spPr bwMode="auto">
           <a:xfrm>
-            <a:off x="6121400" y="2540000"/>
+            <a:off x="6121400" y="1828800"/>
             <a:ext cx="2133600" cy="863600"/>
           </a:xfrm>
           <a:prstGeom prst="rect">
@@ -9342,7 +9333,7 @@
         </p:blipFill>
         <p:spPr bwMode="auto">
           <a:xfrm>
-            <a:off x="6350000" y="1447800"/>
+            <a:off x="6350000" y="736600"/>
             <a:ext cx="1905000" cy="685800"/>
           </a:xfrm>
           <a:prstGeom prst="rect">
@@ -9437,8 +9428,38 @@
         </p:blipFill>
         <p:spPr>
           <a:xfrm>
-            <a:off x="5715000" y="3657600"/>
+            <a:off x="5715000" y="2946400"/>
             <a:ext cx="2540000" cy="914400"/>
+          </a:xfrm>
+          <a:prstGeom prst="rect">
+            <a:avLst/>
+          </a:prstGeom>
+        </p:spPr>
+      </p:pic>
+      <p:pic>
+        <p:nvPicPr>
+          <p:cNvPr id="9" name="Picture 8"/>
+          <p:cNvPicPr>
+            <a:picLocks noChangeAspect="1"/>
+          </p:cNvPicPr>
+          <p:nvPr/>
+        </p:nvPicPr>
+        <p:blipFill>
+          <a:blip r:embed="rId6">
+            <a:extLst>
+              <a:ext uri="{28A0092B-C50C-407E-A947-70E740481C1C}">
+                <a14:useLocalDpi xmlns:a14="http://schemas.microsoft.com/office/drawing/2010/main" val="0"/>
+              </a:ext>
+            </a:extLst>
+          </a:blip>
+          <a:stretch>
+            <a:fillRect/>
+          </a:stretch>
+        </p:blipFill>
+        <p:spPr>
+          <a:xfrm>
+            <a:off x="5715000" y="4114799"/>
+            <a:ext cx="2540000" cy="841003"/>
           </a:xfrm>
           <a:prstGeom prst="rect">
             <a:avLst/>
@@ -9455,13 +9476,13 @@
   <p:clrMapOvr>
     <a:masterClrMapping/>
   </p:clrMapOvr>
-  <mc:AlternateContent xmlns:mc="http://schemas.openxmlformats.org/markup-compatibility/2006">
-    <mc:Choice xmlns:p14="http://schemas.microsoft.com/office/powerpoint/2010/main" Requires="p14">
+  <mc:AlternateContent xmlns:mc="http://schemas.openxmlformats.org/markup-compatibility/2006" xmlns:p14="http://schemas.microsoft.com/office/powerpoint/2010/main">
+    <mc:Choice Requires="p14">
       <p:transition spd="med" p14:dur="700">
         <p:fade/>
       </p:transition>
     </mc:Choice>
-    <mc:Fallback>
+    <mc:Fallback xmlns="">
       <p:transition xmlns:p14="http://schemas.microsoft.com/office/powerpoint/2010/main" spd="med">
         <p:fade/>
       </p:transition>
@@ -9470,7 +9491,7 @@
   <p:timing>
     <p:tnLst>
       <p:par>
-        <p:cTn xmlns:p14="http://schemas.microsoft.com/office/powerpoint/2010/main" id="1" dur="indefinite" restart="never" nodeType="tmRoot"/>
+        <p:cTn id="1" dur="indefinite" restart="never" nodeType="tmRoot"/>
       </p:par>
     </p:tnLst>
   </p:timing>
@@ -9563,13 +9584,13 @@
   <p:clrMapOvr>
     <a:masterClrMapping/>
   </p:clrMapOvr>
-  <p:transition xmlns:p14="http://schemas.microsoft.com/office/powerpoint/2010/main">
+  <p:transition>
     <p:fade/>
   </p:transition>
   <p:timing>
     <p:tnLst>
       <p:par>
-        <p:cTn xmlns:p14="http://schemas.microsoft.com/office/powerpoint/2010/main" id="1" dur="indefinite" restart="never" nodeType="tmRoot"/>
+        <p:cTn id="1" dur="indefinite" restart="never" nodeType="tmRoot"/>
       </p:par>
     </p:tnLst>
   </p:timing>
@@ -9652,13 +9673,13 @@
   <p:clrMapOvr>
     <a:masterClrMapping/>
   </p:clrMapOvr>
-  <p:transition xmlns:p14="http://schemas.microsoft.com/office/powerpoint/2010/main">
+  <p:transition>
     <p:fade/>
   </p:transition>
   <p:timing>
     <p:tnLst>
       <p:par>
-        <p:cTn xmlns:p14="http://schemas.microsoft.com/office/powerpoint/2010/main" id="1" dur="indefinite" restart="never" nodeType="tmRoot"/>
+        <p:cTn id="1" dur="indefinite" restart="never" nodeType="tmRoot"/>
       </p:par>
     </p:tnLst>
   </p:timing>

</xml_diff>

<commit_message>
Fixed the typo on the slides.
</commit_message>
<xml_diff>
--- a/slides/AdvancedMvc.pptx
+++ b/slides/AdvancedMvc.pptx
@@ -248,7 +248,7 @@
               <a:pPr>
                 <a:defRPr/>
               </a:pPr>
-              <a:t>8/3/2012 8:48 AM</a:t>
+              <a:t>8/3/2012 12:06 PM</a:t>
             </a:fld>
             <a:endParaRPr lang="en-US"/>
           </a:p>
@@ -463,7 +463,7 @@
               <a:pPr>
                 <a:defRPr/>
               </a:pPr>
-              <a:t>8/3/2012 8:48 AM</a:t>
+              <a:t>8/3/2012 12:06 PM</a:t>
             </a:fld>
             <a:endParaRPr lang="en-US"/>
           </a:p>
@@ -868,7 +868,7 @@
             <a:fld id="{645EDAD1-88E4-4536-AD95-0BFD82EC77E6}" type="datetime8">
               <a:rPr lang="en-US" smtClean="0"/>
               <a:pPr/>
-              <a:t>8/3/2012 8:48 AM</a:t>
+              <a:t>8/3/2012 12:06 PM</a:t>
             </a:fld>
             <a:endParaRPr lang="en-US" smtClean="0"/>
           </a:p>
@@ -9158,8 +9158,13 @@
           <a:p>
             <a:r>
               <a:rPr lang="en-US" dirty="0" smtClean="0"/>
-              <a:t>Custom Results</a:t>
-            </a:r>
+              <a:t>Custom </a:t>
+            </a:r>
+            <a:r>
+              <a:rPr lang="en-US" dirty="0" smtClean="0"/>
+              <a:t>Filters</a:t>
+            </a:r>
+            <a:endParaRPr lang="en-US" dirty="0" smtClean="0"/>
           </a:p>
           <a:p>
             <a:r>

</xml_diff>